<commit_message>
Add final version of slides.
</commit_message>
<xml_diff>
--- a/Inferential Statistics.pptx
+++ b/Inferential Statistics.pptx
@@ -29,15 +29,16 @@
     <p:sldId id="274" r:id="rId23"/>
     <p:sldId id="275" r:id="rId24"/>
     <p:sldId id="276" r:id="rId25"/>
+    <p:sldId id="277" r:id="rId26"/>
   </p:sldIdLst>
   <p:sldSz cy="5143500" cx="9144000"/>
   <p:notesSz cx="6858000" cy="9144000"/>
   <p:embeddedFontLst>
     <p:embeddedFont>
       <p:font typeface="Old Standard TT"/>
-      <p:regular r:id="rId26"/>
-      <p:bold r:id="rId27"/>
-      <p:italic r:id="rId28"/>
+      <p:regular r:id="rId27"/>
+      <p:bold r:id="rId28"/>
+      <p:italic r:id="rId29"/>
     </p:embeddedFont>
   </p:embeddedFontLst>
   <p:defaultTextStyle>
@@ -771,7 +772,7 @@
           </a:bodyPr>
           <a:lstStyle/>
           <a:p>
-            <a:pPr lvl="0" rtl="0">
+            <a:pPr lvl="0">
               <a:spcBef>
                 <a:spcPts val="0"/>
               </a:spcBef>
@@ -1151,7 +1152,7 @@
           </a:bodyPr>
           <a:lstStyle/>
           <a:p>
-            <a:pPr lvl="0">
+            <a:pPr lvl="0" rtl="0">
               <a:spcBef>
                 <a:spcPts val="0"/>
               </a:spcBef>
@@ -1177,7 +1178,7 @@
   <p:cSld>
     <p:spTree>
       <p:nvGrpSpPr>
-        <p:cNvPr id="162" name="Shape 162"/>
+        <p:cNvPr id="164" name="Shape 164"/>
         <p:cNvGrpSpPr/>
         <p:nvPr/>
       </p:nvGrpSpPr>
@@ -1191,7 +1192,7 @@
       </p:grpSpPr>
       <p:sp>
         <p:nvSpPr>
-          <p:cNvPr id="163" name="Shape 163"/>
+          <p:cNvPr id="165" name="Shape 165"/>
           <p:cNvSpPr/>
           <p:nvPr>
             <p:ph idx="2" type="sldImg"/>
@@ -1225,7 +1226,7 @@
       </p:sp>
       <p:sp>
         <p:nvSpPr>
-          <p:cNvPr id="164" name="Shape 164"/>
+          <p:cNvPr id="166" name="Shape 166"/>
           <p:cNvSpPr txBox="1"/>
           <p:nvPr>
             <p:ph idx="1" type="body"/>
@@ -1272,7 +1273,7 @@
   <p:cSld>
     <p:spTree>
       <p:nvGrpSpPr>
-        <p:cNvPr id="170" name="Shape 170"/>
+        <p:cNvPr id="169" name="Shape 169"/>
         <p:cNvGrpSpPr/>
         <p:nvPr/>
       </p:nvGrpSpPr>
@@ -1286,7 +1287,7 @@
       </p:grpSpPr>
       <p:sp>
         <p:nvSpPr>
-          <p:cNvPr id="171" name="Shape 171"/>
+          <p:cNvPr id="170" name="Shape 170"/>
           <p:cNvSpPr/>
           <p:nvPr>
             <p:ph idx="2" type="sldImg"/>
@@ -1320,7 +1321,7 @@
       </p:sp>
       <p:sp>
         <p:nvSpPr>
-          <p:cNvPr id="172" name="Shape 172"/>
+          <p:cNvPr id="171" name="Shape 171"/>
           <p:cNvSpPr txBox="1"/>
           <p:nvPr>
             <p:ph idx="1" type="body"/>
@@ -1557,7 +1558,7 @@
   <p:cSld>
     <p:spTree>
       <p:nvGrpSpPr>
-        <p:cNvPr id="185" name="Shape 185"/>
+        <p:cNvPr id="184" name="Shape 184"/>
         <p:cNvGrpSpPr/>
         <p:nvPr/>
       </p:nvGrpSpPr>
@@ -1571,7 +1572,7 @@
       </p:grpSpPr>
       <p:sp>
         <p:nvSpPr>
-          <p:cNvPr id="186" name="Shape 186"/>
+          <p:cNvPr id="185" name="Shape 185"/>
           <p:cNvSpPr/>
           <p:nvPr>
             <p:ph idx="2" type="sldImg"/>
@@ -1605,7 +1606,7 @@
       </p:sp>
       <p:sp>
         <p:nvSpPr>
-          <p:cNvPr id="187" name="Shape 187"/>
+          <p:cNvPr id="186" name="Shape 186"/>
           <p:cNvSpPr txBox="1"/>
           <p:nvPr>
             <p:ph idx="1" type="body"/>
@@ -1652,7 +1653,7 @@
   <p:cSld>
     <p:spTree>
       <p:nvGrpSpPr>
-        <p:cNvPr id="193" name="Shape 193"/>
+        <p:cNvPr id="192" name="Shape 192"/>
         <p:cNvGrpSpPr/>
         <p:nvPr/>
       </p:nvGrpSpPr>
@@ -1666,7 +1667,7 @@
       </p:grpSpPr>
       <p:sp>
         <p:nvSpPr>
-          <p:cNvPr id="194" name="Shape 194"/>
+          <p:cNvPr id="193" name="Shape 193"/>
           <p:cNvSpPr/>
           <p:nvPr>
             <p:ph idx="2" type="sldImg"/>
@@ -1700,7 +1701,7 @@
       </p:sp>
       <p:sp>
         <p:nvSpPr>
-          <p:cNvPr id="195" name="Shape 195"/>
+          <p:cNvPr id="194" name="Shape 194"/>
           <p:cNvSpPr txBox="1"/>
           <p:nvPr>
             <p:ph idx="1" type="body"/>
@@ -1742,12 +1743,12 @@
 </p:notes>
 </file>
 
-<file path=ppt/notesSlides/notesSlide3.xml><?xml version="1.0" encoding="utf-8"?>
+<file path=ppt/notesSlides/notesSlide22.xml><?xml version="1.0" encoding="utf-8"?>
 <p:notes xmlns:a="http://schemas.openxmlformats.org/drawingml/2006/main" xmlns:r="http://schemas.openxmlformats.org/officeDocument/2006/relationships" xmlns:mc="http://schemas.openxmlformats.org/markup-compatibility/2006" xmlns:mv="urn:schemas-microsoft-com:mac:vml" xmlns:p="http://schemas.openxmlformats.org/presentationml/2006/main" xmlns:c="http://schemas.openxmlformats.org/drawingml/2006/chart" xmlns:dgm="http://schemas.openxmlformats.org/drawingml/2006/diagram" xmlns:o="urn:schemas-microsoft-com:office:office" xmlns:v="urn:schemas-microsoft-com:vml" xmlns:pvml="urn:schemas-microsoft-com:office:powerpoint" xmlns:com="http://schemas.openxmlformats.org/drawingml/2006/compatibility" xmlns:p14="http://schemas.microsoft.com/office/powerpoint/2010/main" xmlns:p15="http://schemas.microsoft.com/office/powerpoint/2012/main" showMasterPhAnim="0" showMasterSp="0">
   <p:cSld>
     <p:spTree>
       <p:nvGrpSpPr>
-        <p:cNvPr id="68" name="Shape 68"/>
+        <p:cNvPr id="200" name="Shape 200"/>
         <p:cNvGrpSpPr/>
         <p:nvPr/>
       </p:nvGrpSpPr>
@@ -1761,7 +1762,7 @@
       </p:grpSpPr>
       <p:sp>
         <p:nvSpPr>
-          <p:cNvPr id="69" name="Shape 69"/>
+          <p:cNvPr id="201" name="Shape 201"/>
           <p:cNvSpPr/>
           <p:nvPr>
             <p:ph idx="2" type="sldImg"/>
@@ -1795,7 +1796,7 @@
       </p:sp>
       <p:sp>
         <p:nvSpPr>
-          <p:cNvPr id="70" name="Shape 70"/>
+          <p:cNvPr id="202" name="Shape 202"/>
           <p:cNvSpPr txBox="1"/>
           <p:nvPr>
             <p:ph idx="1" type="body"/>
@@ -1837,12 +1838,12 @@
 </p:notes>
 </file>
 
-<file path=ppt/notesSlides/notesSlide4.xml><?xml version="1.0" encoding="utf-8"?>
+<file path=ppt/notesSlides/notesSlide3.xml><?xml version="1.0" encoding="utf-8"?>
 <p:notes xmlns:a="http://schemas.openxmlformats.org/drawingml/2006/main" xmlns:r="http://schemas.openxmlformats.org/officeDocument/2006/relationships" xmlns:mc="http://schemas.openxmlformats.org/markup-compatibility/2006" xmlns:mv="urn:schemas-microsoft-com:mac:vml" xmlns:p="http://schemas.openxmlformats.org/presentationml/2006/main" xmlns:c="http://schemas.openxmlformats.org/drawingml/2006/chart" xmlns:dgm="http://schemas.openxmlformats.org/drawingml/2006/diagram" xmlns:o="urn:schemas-microsoft-com:office:office" xmlns:v="urn:schemas-microsoft-com:vml" xmlns:pvml="urn:schemas-microsoft-com:office:powerpoint" xmlns:com="http://schemas.openxmlformats.org/drawingml/2006/compatibility" xmlns:p14="http://schemas.microsoft.com/office/powerpoint/2010/main" xmlns:p15="http://schemas.microsoft.com/office/powerpoint/2012/main" showMasterPhAnim="0" showMasterSp="0">
   <p:cSld>
     <p:spTree>
       <p:nvGrpSpPr>
-        <p:cNvPr id="74" name="Shape 74"/>
+        <p:cNvPr id="69" name="Shape 69"/>
         <p:cNvGrpSpPr/>
         <p:nvPr/>
       </p:nvGrpSpPr>
@@ -1856,7 +1857,7 @@
       </p:grpSpPr>
       <p:sp>
         <p:nvSpPr>
-          <p:cNvPr id="75" name="Shape 75"/>
+          <p:cNvPr id="70" name="Shape 70"/>
           <p:cNvSpPr/>
           <p:nvPr>
             <p:ph idx="2" type="sldImg"/>
@@ -1890,7 +1891,7 @@
       </p:sp>
       <p:sp>
         <p:nvSpPr>
-          <p:cNvPr id="76" name="Shape 76"/>
+          <p:cNvPr id="71" name="Shape 71"/>
           <p:cNvSpPr txBox="1"/>
           <p:nvPr>
             <p:ph idx="1" type="body"/>
@@ -1932,12 +1933,12 @@
 </p:notes>
 </file>
 
-<file path=ppt/notesSlides/notesSlide5.xml><?xml version="1.0" encoding="utf-8"?>
+<file path=ppt/notesSlides/notesSlide4.xml><?xml version="1.0" encoding="utf-8"?>
 <p:notes xmlns:a="http://schemas.openxmlformats.org/drawingml/2006/main" xmlns:r="http://schemas.openxmlformats.org/officeDocument/2006/relationships" xmlns:mc="http://schemas.openxmlformats.org/markup-compatibility/2006" xmlns:mv="urn:schemas-microsoft-com:mac:vml" xmlns:p="http://schemas.openxmlformats.org/presentationml/2006/main" xmlns:c="http://schemas.openxmlformats.org/drawingml/2006/chart" xmlns:dgm="http://schemas.openxmlformats.org/drawingml/2006/diagram" xmlns:o="urn:schemas-microsoft-com:office:office" xmlns:v="urn:schemas-microsoft-com:vml" xmlns:pvml="urn:schemas-microsoft-com:office:powerpoint" xmlns:com="http://schemas.openxmlformats.org/drawingml/2006/compatibility" xmlns:p14="http://schemas.microsoft.com/office/powerpoint/2010/main" xmlns:p15="http://schemas.microsoft.com/office/powerpoint/2012/main" showMasterPhAnim="0" showMasterSp="0">
   <p:cSld>
     <p:spTree>
       <p:nvGrpSpPr>
-        <p:cNvPr id="82" name="Shape 82"/>
+        <p:cNvPr id="75" name="Shape 75"/>
         <p:cNvGrpSpPr/>
         <p:nvPr/>
       </p:nvGrpSpPr>
@@ -1951,7 +1952,7 @@
       </p:grpSpPr>
       <p:sp>
         <p:nvSpPr>
-          <p:cNvPr id="83" name="Shape 83"/>
+          <p:cNvPr id="76" name="Shape 76"/>
           <p:cNvSpPr/>
           <p:nvPr>
             <p:ph idx="2" type="sldImg"/>
@@ -1985,7 +1986,7 @@
       </p:sp>
       <p:sp>
         <p:nvSpPr>
-          <p:cNvPr id="84" name="Shape 84"/>
+          <p:cNvPr id="77" name="Shape 77"/>
           <p:cNvSpPr txBox="1"/>
           <p:nvPr>
             <p:ph idx="1" type="body"/>
@@ -2027,12 +2028,12 @@
 </p:notes>
 </file>
 
-<file path=ppt/notesSlides/notesSlide6.xml><?xml version="1.0" encoding="utf-8"?>
+<file path=ppt/notesSlides/notesSlide5.xml><?xml version="1.0" encoding="utf-8"?>
 <p:notes xmlns:a="http://schemas.openxmlformats.org/drawingml/2006/main" xmlns:r="http://schemas.openxmlformats.org/officeDocument/2006/relationships" xmlns:mc="http://schemas.openxmlformats.org/markup-compatibility/2006" xmlns:mv="urn:schemas-microsoft-com:mac:vml" xmlns:p="http://schemas.openxmlformats.org/presentationml/2006/main" xmlns:c="http://schemas.openxmlformats.org/drawingml/2006/chart" xmlns:dgm="http://schemas.openxmlformats.org/drawingml/2006/diagram" xmlns:o="urn:schemas-microsoft-com:office:office" xmlns:v="urn:schemas-microsoft-com:vml" xmlns:pvml="urn:schemas-microsoft-com:office:powerpoint" xmlns:com="http://schemas.openxmlformats.org/drawingml/2006/compatibility" xmlns:p14="http://schemas.microsoft.com/office/powerpoint/2010/main" xmlns:p15="http://schemas.microsoft.com/office/powerpoint/2012/main" showMasterPhAnim="0" showMasterSp="0">
   <p:cSld>
     <p:spTree>
       <p:nvGrpSpPr>
-        <p:cNvPr id="88" name="Shape 88"/>
+        <p:cNvPr id="81" name="Shape 81"/>
         <p:cNvGrpSpPr/>
         <p:nvPr/>
       </p:nvGrpSpPr>
@@ -2046,7 +2047,7 @@
       </p:grpSpPr>
       <p:sp>
         <p:nvSpPr>
-          <p:cNvPr id="89" name="Shape 89"/>
+          <p:cNvPr id="82" name="Shape 82"/>
           <p:cNvSpPr/>
           <p:nvPr>
             <p:ph idx="2" type="sldImg"/>
@@ -2080,7 +2081,102 @@
       </p:sp>
       <p:sp>
         <p:nvSpPr>
+          <p:cNvPr id="83" name="Shape 83"/>
+          <p:cNvSpPr txBox="1"/>
+          <p:nvPr>
+            <p:ph idx="1" type="body"/>
+          </p:nvPr>
+        </p:nvSpPr>
+        <p:spPr>
+          <a:xfrm>
+            <a:off x="685800" y="4343400"/>
+            <a:ext cx="5486400" cy="4114800"/>
+          </a:xfrm>
+          <a:prstGeom prst="rect">
+            <a:avLst/>
+          </a:prstGeom>
+        </p:spPr>
+        <p:txBody>
+          <a:bodyPr anchorCtr="0" anchor="t" bIns="91425" lIns="91425" rIns="91425" wrap="square" tIns="91425">
+            <a:noAutofit/>
+          </a:bodyPr>
+          <a:lstStyle/>
+          <a:p>
+            <a:pPr lvl="0">
+              <a:spcBef>
+                <a:spcPts val="0"/>
+              </a:spcBef>
+              <a:buNone/>
+            </a:pPr>
+            <a:r>
+              <a:t/>
+            </a:r>
+            <a:endParaRPr/>
+          </a:p>
+        </p:txBody>
+      </p:sp>
+    </p:spTree>
+  </p:cSld>
+  <p:clrMapOvr>
+    <a:masterClrMapping/>
+  </p:clrMapOvr>
+</p:notes>
+</file>
+
+<file path=ppt/notesSlides/notesSlide6.xml><?xml version="1.0" encoding="utf-8"?>
+<p:notes xmlns:a="http://schemas.openxmlformats.org/drawingml/2006/main" xmlns:r="http://schemas.openxmlformats.org/officeDocument/2006/relationships" xmlns:mc="http://schemas.openxmlformats.org/markup-compatibility/2006" xmlns:mv="urn:schemas-microsoft-com:mac:vml" xmlns:p="http://schemas.openxmlformats.org/presentationml/2006/main" xmlns:c="http://schemas.openxmlformats.org/drawingml/2006/chart" xmlns:dgm="http://schemas.openxmlformats.org/drawingml/2006/diagram" xmlns:o="urn:schemas-microsoft-com:office:office" xmlns:v="urn:schemas-microsoft-com:vml" xmlns:pvml="urn:schemas-microsoft-com:office:powerpoint" xmlns:com="http://schemas.openxmlformats.org/drawingml/2006/compatibility" xmlns:p14="http://schemas.microsoft.com/office/powerpoint/2010/main" xmlns:p15="http://schemas.microsoft.com/office/powerpoint/2012/main" showMasterPhAnim="0" showMasterSp="0">
+  <p:cSld>
+    <p:spTree>
+      <p:nvGrpSpPr>
+        <p:cNvPr id="89" name="Shape 89"/>
+        <p:cNvGrpSpPr/>
+        <p:nvPr/>
+      </p:nvGrpSpPr>
+      <p:grpSpPr>
+        <a:xfrm>
+          <a:off x="0" y="0"/>
+          <a:ext cx="0" cy="0"/>
+          <a:chOff x="0" y="0"/>
+          <a:chExt cx="0" cy="0"/>
+        </a:xfrm>
+      </p:grpSpPr>
+      <p:sp>
+        <p:nvSpPr>
           <p:cNvPr id="90" name="Shape 90"/>
+          <p:cNvSpPr/>
+          <p:nvPr>
+            <p:ph idx="2" type="sldImg"/>
+          </p:nvPr>
+        </p:nvSpPr>
+        <p:spPr>
+          <a:xfrm>
+            <a:off x="381300" y="685800"/>
+            <a:ext cx="6096000" cy="3429000"/>
+          </a:xfrm>
+          <a:custGeom>
+            <a:pathLst>
+              <a:path extrusionOk="0" h="120000" w="120000">
+                <a:moveTo>
+                  <a:pt x="0" y="0"/>
+                </a:moveTo>
+                <a:lnTo>
+                  <a:pt x="120000" y="0"/>
+                </a:lnTo>
+                <a:lnTo>
+                  <a:pt x="120000" y="120000"/>
+                </a:lnTo>
+                <a:lnTo>
+                  <a:pt x="0" y="120000"/>
+                </a:lnTo>
+                <a:close/>
+              </a:path>
+            </a:pathLst>
+          </a:custGeom>
+        </p:spPr>
+      </p:sp>
+      <p:sp>
+        <p:nvSpPr>
+          <p:cNvPr id="91" name="Shape 91"/>
           <p:cNvSpPr txBox="1"/>
           <p:nvPr>
             <p:ph idx="1" type="body"/>
@@ -2196,7 +2292,7 @@
           </a:bodyPr>
           <a:lstStyle/>
           <a:p>
-            <a:pPr lvl="0" rtl="0">
+            <a:pPr lvl="0">
               <a:spcBef>
                 <a:spcPts val="0"/>
               </a:spcBef>
@@ -2291,7 +2387,7 @@
           </a:bodyPr>
           <a:lstStyle/>
           <a:p>
-            <a:pPr lvl="0">
+            <a:pPr lvl="0" rtl="0">
               <a:spcBef>
                 <a:spcPts val="0"/>
               </a:spcBef>
@@ -2317,7 +2413,7 @@
   <p:cSld>
     <p:spTree>
       <p:nvGrpSpPr>
-        <p:cNvPr id="108" name="Shape 108"/>
+        <p:cNvPr id="109" name="Shape 109"/>
         <p:cNvGrpSpPr/>
         <p:nvPr/>
       </p:nvGrpSpPr>
@@ -2331,7 +2427,7 @@
       </p:grpSpPr>
       <p:sp>
         <p:nvSpPr>
-          <p:cNvPr id="109" name="Shape 109"/>
+          <p:cNvPr id="110" name="Shape 110"/>
           <p:cNvSpPr/>
           <p:nvPr>
             <p:ph idx="2" type="sldImg"/>
@@ -2365,7 +2461,7 @@
       </p:sp>
       <p:sp>
         <p:nvSpPr>
-          <p:cNvPr id="110" name="Shape 110"/>
+          <p:cNvPr id="111" name="Shape 111"/>
           <p:cNvSpPr txBox="1"/>
           <p:nvPr>
             <p:ph idx="1" type="body"/>
@@ -6623,7 +6719,7 @@
         </p:nvSpPr>
         <p:spPr>
           <a:xfrm>
-            <a:off x="311700" y="298650"/>
+            <a:off x="311700" y="445025"/>
             <a:ext cx="8520600" cy="613200"/>
           </a:xfrm>
           <a:prstGeom prst="rect">
@@ -6644,7 +6740,7 @@
             </a:pPr>
             <a:r>
               <a:rPr lang="en"/>
-              <a:t>Steps</a:t>
+              <a:t>Terminology</a:t>
             </a:r>
           </a:p>
         </p:txBody>
@@ -6659,8 +6755,8 @@
         </p:nvSpPr>
         <p:spPr>
           <a:xfrm>
-            <a:off x="3488100" y="1228600"/>
-            <a:ext cx="5344200" cy="3397200"/>
+            <a:off x="311700" y="1464300"/>
+            <a:ext cx="8520600" cy="3397200"/>
           </a:xfrm>
           <a:prstGeom prst="rect">
             <a:avLst/>
@@ -6684,7 +6780,7 @@
             </a:pPr>
             <a:r>
               <a:rPr lang="en"/>
-              <a:t>Formulate the Null and the Alternate Hypothesis.​</a:t>
+              <a:t>Null and Alternate Hypotheses</a:t>
             </a:r>
           </a:p>
           <a:p>
@@ -6700,7 +6796,7 @@
             </a:pPr>
             <a:r>
               <a:rPr lang="en"/>
-              <a:t>Decide on the Statistical Test to use.​</a:t>
+              <a:t>Significance Level</a:t>
             </a:r>
           </a:p>
           <a:p>
@@ -6716,49 +6812,21 @@
             </a:pPr>
             <a:r>
               <a:rPr lang="en"/>
-              <a:t>Calculate the p-value​</a:t>
+              <a:t>Statistical Test</a:t>
             </a:r>
           </a:p>
           <a:p>
-            <a:pPr indent="-342900" lvl="0" marL="457200" rtl="0">
-              <a:spcBef>
-                <a:spcPts val="0"/>
-              </a:spcBef>
-              <a:spcAft>
-                <a:spcPts val="0"/>
-              </a:spcAft>
+            <a:pPr indent="-342900" lvl="0" marL="457200">
+              <a:spcBef>
+                <a:spcPts val="0"/>
+              </a:spcBef>
               <a:buSzPts val="1800"/>
               <a:buAutoNum type="arabicPeriod"/>
             </a:pPr>
             <a:r>
               <a:rPr lang="en"/>
-              <a:t>Compare p-value to the significance level, alpha. Reject/Accept Null Hypothesis based on the comparison.</a:t>
+              <a:t>P-Values</a:t>
             </a:r>
-          </a:p>
-          <a:p>
-            <a:pPr indent="-342900" lvl="0" marL="457200" rtl="0">
-              <a:spcBef>
-                <a:spcPts val="0"/>
-              </a:spcBef>
-              <a:buSzPts val="1800"/>
-              <a:buAutoNum type="arabicPeriod"/>
-            </a:pPr>
-            <a:r>
-              <a:rPr lang="en"/>
-              <a:t>Summarize the result</a:t>
-            </a:r>
-          </a:p>
-          <a:p>
-            <a:pPr lvl="0">
-              <a:spcBef>
-                <a:spcPts val="0"/>
-              </a:spcBef>
-              <a:buNone/>
-            </a:pPr>
-            <a:r>
-              <a:t/>
-            </a:r>
-            <a:endParaRPr/>
           </a:p>
         </p:txBody>
       </p:sp>
@@ -6778,8 +6846,8 @@
         </p:blipFill>
         <p:spPr>
           <a:xfrm>
-            <a:off x="152400" y="1449433"/>
-            <a:ext cx="3183300" cy="2244635"/>
+            <a:off x="4681546" y="1082363"/>
+            <a:ext cx="3953776" cy="2978775"/>
           </a:xfrm>
           <a:prstGeom prst="rect">
             <a:avLst/>
@@ -6825,62 +6893,12 @@
         </p:nvSpPr>
         <p:spPr>
           <a:xfrm>
-            <a:off x="460425" y="1140600"/>
-            <a:ext cx="4735500" cy="1688100"/>
-          </a:xfrm>
-          <a:prstGeom prst="rect">
-            <a:avLst/>
-          </a:prstGeom>
-        </p:spPr>
-        <p:txBody>
-          <a:bodyPr anchorCtr="0" anchor="b" bIns="91425" lIns="91425" rIns="91425" wrap="square" tIns="91425">
-            <a:noAutofit/>
-          </a:bodyPr>
-          <a:lstStyle/>
-          <a:p>
-            <a:pPr lvl="0">
-              <a:spcBef>
-                <a:spcPts val="0"/>
-              </a:spcBef>
-              <a:buNone/>
-            </a:pPr>
-            <a:r>
-              <a:rPr lang="en"/>
-              <a:t>Suicide by Gender</a:t>
-            </a:r>
-          </a:p>
-          <a:p>
-            <a:pPr lvl="0">
-              <a:spcBef>
-                <a:spcPts val="0"/>
-              </a:spcBef>
-              <a:buNone/>
-            </a:pPr>
-            <a:r>
-              <a:t/>
-            </a:r>
-            <a:endParaRPr sz="2400"/>
-          </a:p>
-        </p:txBody>
-      </p:sp>
-      <p:sp>
-        <p:nvSpPr>
-          <p:cNvPr id="127" name="Shape 127"/>
-          <p:cNvSpPr txBox="1"/>
-          <p:nvPr/>
-        </p:nvSpPr>
-        <p:spPr>
-          <a:xfrm>
-            <a:off x="460425" y="2567325"/>
-            <a:ext cx="4756800" cy="616800"/>
-          </a:xfrm>
-          <a:prstGeom prst="rect">
-            <a:avLst/>
-          </a:prstGeom>
-          <a:noFill/>
-          <a:ln>
-            <a:noFill/>
-          </a:ln>
+            <a:off x="311700" y="298650"/>
+            <a:ext cx="8520600" cy="613200"/>
+          </a:xfrm>
+          <a:prstGeom prst="rect">
+            <a:avLst/>
+          </a:prstGeom>
         </p:spPr>
         <p:txBody>
           <a:bodyPr anchorCtr="0" anchor="t" bIns="91425" lIns="91425" rIns="91425" wrap="square" tIns="91425">
@@ -6895,17 +6913,122 @@
               <a:buNone/>
             </a:pPr>
             <a:r>
-              <a:rPr lang="en">
-                <a:solidFill>
-                  <a:schemeClr val="lt1"/>
-                </a:solidFill>
-                <a:latin typeface="Old Standard TT"/>
-                <a:ea typeface="Old Standard TT"/>
-                <a:cs typeface="Old Standard TT"/>
-                <a:sym typeface="Old Standard TT"/>
-              </a:rPr>
-              <a:t>In India, are men as likely as women to commit suicide? </a:t>
+              <a:rPr lang="en"/>
+              <a:t>Steps</a:t>
             </a:r>
+          </a:p>
+        </p:txBody>
+      </p:sp>
+      <p:sp>
+        <p:nvSpPr>
+          <p:cNvPr id="127" name="Shape 127"/>
+          <p:cNvSpPr txBox="1"/>
+          <p:nvPr>
+            <p:ph idx="1" type="body"/>
+          </p:nvPr>
+        </p:nvSpPr>
+        <p:spPr>
+          <a:xfrm>
+            <a:off x="3488100" y="1228600"/>
+            <a:ext cx="5344200" cy="3397200"/>
+          </a:xfrm>
+          <a:prstGeom prst="rect">
+            <a:avLst/>
+          </a:prstGeom>
+        </p:spPr>
+        <p:txBody>
+          <a:bodyPr anchorCtr="0" anchor="t" bIns="91425" lIns="91425" rIns="91425" wrap="square" tIns="91425">
+            <a:noAutofit/>
+          </a:bodyPr>
+          <a:lstStyle/>
+          <a:p>
+            <a:pPr indent="-342900" lvl="0" marL="457200" rtl="0">
+              <a:spcBef>
+                <a:spcPts val="0"/>
+              </a:spcBef>
+              <a:spcAft>
+                <a:spcPts val="0"/>
+              </a:spcAft>
+              <a:buSzPts val="1800"/>
+              <a:buAutoNum type="arabicPeriod"/>
+            </a:pPr>
+            <a:r>
+              <a:rPr lang="en"/>
+              <a:t>Formulate the Null and the Alternate Hypothesis.​</a:t>
+            </a:r>
+          </a:p>
+          <a:p>
+            <a:pPr indent="-342900" lvl="0" marL="457200" rtl="0">
+              <a:spcBef>
+                <a:spcPts val="0"/>
+              </a:spcBef>
+              <a:spcAft>
+                <a:spcPts val="0"/>
+              </a:spcAft>
+              <a:buSzPts val="1800"/>
+              <a:buAutoNum type="arabicPeriod"/>
+            </a:pPr>
+            <a:r>
+              <a:rPr lang="en"/>
+              <a:t>Decide on the Statistical Test to use.​</a:t>
+            </a:r>
+          </a:p>
+          <a:p>
+            <a:pPr indent="-342900" lvl="0" marL="457200" rtl="0">
+              <a:spcBef>
+                <a:spcPts val="0"/>
+              </a:spcBef>
+              <a:spcAft>
+                <a:spcPts val="0"/>
+              </a:spcAft>
+              <a:buSzPts val="1800"/>
+              <a:buAutoNum type="arabicPeriod"/>
+            </a:pPr>
+            <a:r>
+              <a:rPr lang="en"/>
+              <a:t>Calculate the p-value​</a:t>
+            </a:r>
+          </a:p>
+          <a:p>
+            <a:pPr indent="-342900" lvl="0" marL="457200" rtl="0">
+              <a:spcBef>
+                <a:spcPts val="0"/>
+              </a:spcBef>
+              <a:spcAft>
+                <a:spcPts val="0"/>
+              </a:spcAft>
+              <a:buSzPts val="1800"/>
+              <a:buAutoNum type="arabicPeriod"/>
+            </a:pPr>
+            <a:r>
+              <a:rPr lang="en"/>
+              <a:t>Compare p-value to the significance level, alpha. Reject/Accept Null Hypothesis based on the comparison.</a:t>
+            </a:r>
+          </a:p>
+          <a:p>
+            <a:pPr indent="-342900" lvl="0" marL="457200" rtl="0">
+              <a:spcBef>
+                <a:spcPts val="0"/>
+              </a:spcBef>
+              <a:buSzPts val="1800"/>
+              <a:buAutoNum type="arabicPeriod"/>
+            </a:pPr>
+            <a:r>
+              <a:rPr lang="en"/>
+              <a:t>Summarize the result</a:t>
+            </a:r>
+          </a:p>
+          <a:p>
+            <a:pPr lvl="0">
+              <a:spcBef>
+                <a:spcPts val="0"/>
+              </a:spcBef>
+              <a:buNone/>
+            </a:pPr>
+            <a:r>
+              <a:t/>
+            </a:r>
+            <a:endParaRPr/>
           </a:p>
         </p:txBody>
       </p:sp>
@@ -6925,8 +7048,8 @@
         </p:blipFill>
         <p:spPr>
           <a:xfrm>
-            <a:off x="5582820" y="1140600"/>
-            <a:ext cx="3001057" cy="1688100"/>
+            <a:off x="152400" y="1449433"/>
+            <a:ext cx="3183300" cy="2244635"/>
           </a:xfrm>
           <a:prstGeom prst="rect">
             <a:avLst/>
@@ -6972,7 +7095,7 @@
         </p:nvSpPr>
         <p:spPr>
           <a:xfrm>
-            <a:off x="4255325" y="1119675"/>
+            <a:off x="460425" y="1140600"/>
             <a:ext cx="4735500" cy="1688100"/>
           </a:xfrm>
           <a:prstGeom prst="rect">
@@ -6985,7 +7108,7 @@
           </a:bodyPr>
           <a:lstStyle/>
           <a:p>
-            <a:pPr lvl="0" rtl="0">
+            <a:pPr lvl="0">
               <a:spcBef>
                 <a:spcPts val="0"/>
               </a:spcBef>
@@ -6993,11 +7116,11 @@
             </a:pPr>
             <a:r>
               <a:rPr lang="en"/>
-              <a:t>NBA Player Heights</a:t>
+              <a:t>Suicide by Gender</a:t>
             </a:r>
           </a:p>
           <a:p>
-            <a:pPr lvl="0" rtl="0">
+            <a:pPr lvl="0">
               <a:spcBef>
                 <a:spcPts val="0"/>
               </a:spcBef>
@@ -7018,7 +7141,7 @@
         </p:nvSpPr>
         <p:spPr>
           <a:xfrm>
-            <a:off x="4307600" y="2567325"/>
+            <a:off x="460425" y="2567325"/>
             <a:ext cx="4756800" cy="616800"/>
           </a:xfrm>
           <a:prstGeom prst="rect">
@@ -7035,7 +7158,7 @@
           </a:bodyPr>
           <a:lstStyle/>
           <a:p>
-            <a:pPr lvl="0" rtl="0">
+            <a:pPr lvl="0">
               <a:spcBef>
                 <a:spcPts val="0"/>
               </a:spcBef>
@@ -7051,7 +7174,7 @@
                 <a:cs typeface="Old Standard TT"/>
                 <a:sym typeface="Old Standard TT"/>
               </a:rPr>
-              <a:t>What is the average height of NBA players?</a:t>
+              <a:t>In India, are men as likely as women to commit suicide? </a:t>
             </a:r>
           </a:p>
         </p:txBody>
@@ -7072,8 +7195,8 @@
         </p:blipFill>
         <p:spPr>
           <a:xfrm>
-            <a:off x="240575" y="681150"/>
-            <a:ext cx="3620040" cy="2262525"/>
+            <a:off x="5582820" y="1140600"/>
+            <a:ext cx="3001057" cy="1688100"/>
           </a:xfrm>
           <a:prstGeom prst="rect">
             <a:avLst/>
@@ -7119,6 +7242,153 @@
         </p:nvSpPr>
         <p:spPr>
           <a:xfrm>
+            <a:off x="4255325" y="1119675"/>
+            <a:ext cx="4735500" cy="1688100"/>
+          </a:xfrm>
+          <a:prstGeom prst="rect">
+            <a:avLst/>
+          </a:prstGeom>
+        </p:spPr>
+        <p:txBody>
+          <a:bodyPr anchorCtr="0" anchor="b" bIns="91425" lIns="91425" rIns="91425" wrap="square" tIns="91425">
+            <a:noAutofit/>
+          </a:bodyPr>
+          <a:lstStyle/>
+          <a:p>
+            <a:pPr lvl="0" rtl="0">
+              <a:spcBef>
+                <a:spcPts val="0"/>
+              </a:spcBef>
+              <a:buNone/>
+            </a:pPr>
+            <a:r>
+              <a:rPr lang="en"/>
+              <a:t>NBA Player Heights</a:t>
+            </a:r>
+          </a:p>
+          <a:p>
+            <a:pPr lvl="0" rtl="0">
+              <a:spcBef>
+                <a:spcPts val="0"/>
+              </a:spcBef>
+              <a:buNone/>
+            </a:pPr>
+            <a:r>
+              <a:t/>
+            </a:r>
+            <a:endParaRPr sz="2400"/>
+          </a:p>
+        </p:txBody>
+      </p:sp>
+      <p:sp>
+        <p:nvSpPr>
+          <p:cNvPr id="141" name="Shape 141"/>
+          <p:cNvSpPr txBox="1"/>
+          <p:nvPr/>
+        </p:nvSpPr>
+        <p:spPr>
+          <a:xfrm>
+            <a:off x="4307600" y="2567325"/>
+            <a:ext cx="4756800" cy="616800"/>
+          </a:xfrm>
+          <a:prstGeom prst="rect">
+            <a:avLst/>
+          </a:prstGeom>
+          <a:noFill/>
+          <a:ln>
+            <a:noFill/>
+          </a:ln>
+        </p:spPr>
+        <p:txBody>
+          <a:bodyPr anchorCtr="0" anchor="t" bIns="91425" lIns="91425" rIns="91425" wrap="square" tIns="91425">
+            <a:noAutofit/>
+          </a:bodyPr>
+          <a:lstStyle/>
+          <a:p>
+            <a:pPr lvl="0" rtl="0">
+              <a:spcBef>
+                <a:spcPts val="0"/>
+              </a:spcBef>
+              <a:buNone/>
+            </a:pPr>
+            <a:r>
+              <a:rPr lang="en">
+                <a:solidFill>
+                  <a:schemeClr val="lt1"/>
+                </a:solidFill>
+                <a:latin typeface="Old Standard TT"/>
+                <a:ea typeface="Old Standard TT"/>
+                <a:cs typeface="Old Standard TT"/>
+                <a:sym typeface="Old Standard TT"/>
+              </a:rPr>
+              <a:t>What is the average height of NBA players?</a:t>
+            </a:r>
+          </a:p>
+        </p:txBody>
+      </p:sp>
+      <p:pic>
+        <p:nvPicPr>
+          <p:cNvPr id="142" name="Shape 142"/>
+          <p:cNvPicPr preferRelativeResize="0"/>
+          <p:nvPr/>
+        </p:nvPicPr>
+        <p:blipFill>
+          <a:blip r:embed="rId3">
+            <a:alphaModFix/>
+          </a:blip>
+          <a:stretch>
+            <a:fillRect/>
+          </a:stretch>
+        </p:blipFill>
+        <p:spPr>
+          <a:xfrm>
+            <a:off x="240575" y="681150"/>
+            <a:ext cx="3620040" cy="2262525"/>
+          </a:xfrm>
+          <a:prstGeom prst="rect">
+            <a:avLst/>
+          </a:prstGeom>
+          <a:noFill/>
+          <a:ln>
+            <a:noFill/>
+          </a:ln>
+        </p:spPr>
+      </p:pic>
+    </p:spTree>
+  </p:cSld>
+  <p:clrMapOvr>
+    <a:masterClrMapping/>
+  </p:clrMapOvr>
+</p:sld>
+</file>
+
+<file path=ppt/slides/slide14.xml><?xml version="1.0" encoding="utf-8"?>
+<p:sld xmlns:a="http://schemas.openxmlformats.org/drawingml/2006/main" xmlns:r="http://schemas.openxmlformats.org/officeDocument/2006/relationships" xmlns:mc="http://schemas.openxmlformats.org/markup-compatibility/2006" xmlns:mv="urn:schemas-microsoft-com:mac:vml" xmlns:p="http://schemas.openxmlformats.org/presentationml/2006/main" xmlns:c="http://schemas.openxmlformats.org/drawingml/2006/chart" xmlns:dgm="http://schemas.openxmlformats.org/drawingml/2006/diagram" xmlns:o="urn:schemas-microsoft-com:office:office" xmlns:v="urn:schemas-microsoft-com:vml" xmlns:pvml="urn:schemas-microsoft-com:office:powerpoint" xmlns:com="http://schemas.openxmlformats.org/drawingml/2006/compatibility" xmlns:p14="http://schemas.microsoft.com/office/powerpoint/2010/main" xmlns:p15="http://schemas.microsoft.com/office/powerpoint/2012/main">
+  <p:cSld>
+    <p:spTree>
+      <p:nvGrpSpPr>
+        <p:cNvPr id="146" name="Shape 146"/>
+        <p:cNvGrpSpPr/>
+        <p:nvPr/>
+      </p:nvGrpSpPr>
+      <p:grpSpPr>
+        <a:xfrm>
+          <a:off x="0" y="0"/>
+          <a:ext cx="0" cy="0"/>
+          <a:chOff x="0" y="0"/>
+          <a:chExt cx="0" cy="0"/>
+        </a:xfrm>
+      </p:grpSpPr>
+      <p:sp>
+        <p:nvSpPr>
+          <p:cNvPr id="147" name="Shape 147"/>
+          <p:cNvSpPr txBox="1"/>
+          <p:nvPr>
+            <p:ph type="title"/>
+          </p:nvPr>
+        </p:nvSpPr>
+        <p:spPr>
+          <a:xfrm>
             <a:off x="460425" y="1140600"/>
             <a:ext cx="4735500" cy="1688100"/>
           </a:xfrm>
@@ -7159,7 +7429,7 @@
       </p:sp>
       <p:sp>
         <p:nvSpPr>
-          <p:cNvPr id="141" name="Shape 141"/>
+          <p:cNvPr id="148" name="Shape 148"/>
           <p:cNvSpPr txBox="1"/>
           <p:nvPr/>
         </p:nvSpPr>
@@ -7217,7 +7487,7 @@
       </p:sp>
       <p:pic>
         <p:nvPicPr>
-          <p:cNvPr id="142" name="Shape 142"/>
+          <p:cNvPr id="149" name="Shape 149"/>
           <p:cNvPicPr preferRelativeResize="0"/>
           <p:nvPr/>
         </p:nvPicPr>
@@ -7251,12 +7521,12 @@
 </p:sld>
 </file>
 
-<file path=ppt/slides/slide14.xml><?xml version="1.0" encoding="utf-8"?>
+<file path=ppt/slides/slide15.xml><?xml version="1.0" encoding="utf-8"?>
 <p:sld xmlns:a="http://schemas.openxmlformats.org/drawingml/2006/main" xmlns:r="http://schemas.openxmlformats.org/officeDocument/2006/relationships" xmlns:mc="http://schemas.openxmlformats.org/markup-compatibility/2006" xmlns:mv="urn:schemas-microsoft-com:mac:vml" xmlns:p="http://schemas.openxmlformats.org/presentationml/2006/main" xmlns:c="http://schemas.openxmlformats.org/drawingml/2006/chart" xmlns:dgm="http://schemas.openxmlformats.org/drawingml/2006/diagram" xmlns:o="urn:schemas-microsoft-com:office:office" xmlns:v="urn:schemas-microsoft-com:vml" xmlns:pvml="urn:schemas-microsoft-com:office:powerpoint" xmlns:com="http://schemas.openxmlformats.org/drawingml/2006/compatibility" xmlns:p14="http://schemas.microsoft.com/office/powerpoint/2010/main" xmlns:p15="http://schemas.microsoft.com/office/powerpoint/2012/main">
   <p:cSld>
     <p:spTree>
       <p:nvGrpSpPr>
-        <p:cNvPr id="146" name="Shape 146"/>
+        <p:cNvPr id="153" name="Shape 153"/>
         <p:cNvGrpSpPr/>
         <p:nvPr/>
       </p:nvGrpSpPr>
@@ -7270,7 +7540,7 @@
       </p:grpSpPr>
       <p:sp>
         <p:nvSpPr>
-          <p:cNvPr id="147" name="Shape 147"/>
+          <p:cNvPr id="154" name="Shape 154"/>
           <p:cNvSpPr txBox="1"/>
           <p:nvPr>
             <p:ph type="title"/>
@@ -7318,7 +7588,7 @@
       </p:sp>
       <p:sp>
         <p:nvSpPr>
-          <p:cNvPr id="148" name="Shape 148"/>
+          <p:cNvPr id="155" name="Shape 155"/>
           <p:cNvSpPr txBox="1"/>
           <p:nvPr/>
         </p:nvSpPr>
@@ -7376,153 +7646,6 @@
       </p:sp>
       <p:pic>
         <p:nvPicPr>
-          <p:cNvPr id="149" name="Shape 149"/>
-          <p:cNvPicPr preferRelativeResize="0"/>
-          <p:nvPr/>
-        </p:nvPicPr>
-        <p:blipFill>
-          <a:blip r:embed="rId3">
-            <a:alphaModFix/>
-          </a:blip>
-          <a:stretch>
-            <a:fillRect/>
-          </a:stretch>
-        </p:blipFill>
-        <p:spPr>
-          <a:xfrm>
-            <a:off x="235375" y="880050"/>
-            <a:ext cx="3444675" cy="1938200"/>
-          </a:xfrm>
-          <a:prstGeom prst="rect">
-            <a:avLst/>
-          </a:prstGeom>
-          <a:noFill/>
-          <a:ln>
-            <a:noFill/>
-          </a:ln>
-        </p:spPr>
-      </p:pic>
-    </p:spTree>
-  </p:cSld>
-  <p:clrMapOvr>
-    <a:masterClrMapping/>
-  </p:clrMapOvr>
-</p:sld>
-</file>
-
-<file path=ppt/slides/slide15.xml><?xml version="1.0" encoding="utf-8"?>
-<p:sld xmlns:a="http://schemas.openxmlformats.org/drawingml/2006/main" xmlns:r="http://schemas.openxmlformats.org/officeDocument/2006/relationships" xmlns:mc="http://schemas.openxmlformats.org/markup-compatibility/2006" xmlns:mv="urn:schemas-microsoft-com:mac:vml" xmlns:p="http://schemas.openxmlformats.org/presentationml/2006/main" xmlns:c="http://schemas.openxmlformats.org/drawingml/2006/chart" xmlns:dgm="http://schemas.openxmlformats.org/drawingml/2006/diagram" xmlns:o="urn:schemas-microsoft-com:office:office" xmlns:v="urn:schemas-microsoft-com:vml" xmlns:pvml="urn:schemas-microsoft-com:office:powerpoint" xmlns:com="http://schemas.openxmlformats.org/drawingml/2006/compatibility" xmlns:p14="http://schemas.microsoft.com/office/powerpoint/2010/main" xmlns:p15="http://schemas.microsoft.com/office/powerpoint/2012/main">
-  <p:cSld>
-    <p:spTree>
-      <p:nvGrpSpPr>
-        <p:cNvPr id="153" name="Shape 153"/>
-        <p:cNvGrpSpPr/>
-        <p:nvPr/>
-      </p:nvGrpSpPr>
-      <p:grpSpPr>
-        <a:xfrm>
-          <a:off x="0" y="0"/>
-          <a:ext cx="0" cy="0"/>
-          <a:chOff x="0" y="0"/>
-          <a:chExt cx="0" cy="0"/>
-        </a:xfrm>
-      </p:grpSpPr>
-      <p:sp>
-        <p:nvSpPr>
-          <p:cNvPr id="154" name="Shape 154"/>
-          <p:cNvSpPr txBox="1"/>
-          <p:nvPr>
-            <p:ph type="title"/>
-          </p:nvPr>
-        </p:nvSpPr>
-        <p:spPr>
-          <a:xfrm>
-            <a:off x="460425" y="1140600"/>
-            <a:ext cx="5143200" cy="1688100"/>
-          </a:xfrm>
-          <a:prstGeom prst="rect">
-            <a:avLst/>
-          </a:prstGeom>
-        </p:spPr>
-        <p:txBody>
-          <a:bodyPr anchorCtr="0" anchor="b" bIns="91425" lIns="91425" rIns="91425" wrap="square" tIns="91425">
-            <a:noAutofit/>
-          </a:bodyPr>
-          <a:lstStyle/>
-          <a:p>
-            <a:pPr lvl="0" rtl="0">
-              <a:spcBef>
-                <a:spcPts val="0"/>
-              </a:spcBef>
-              <a:buNone/>
-            </a:pPr>
-            <a:r>
-              <a:rPr lang="en"/>
-              <a:t>Racial Discrimination</a:t>
-            </a:r>
-          </a:p>
-          <a:p>
-            <a:pPr lvl="0" rtl="0">
-              <a:spcBef>
-                <a:spcPts val="0"/>
-              </a:spcBef>
-              <a:buNone/>
-            </a:pPr>
-            <a:r>
-              <a:t/>
-            </a:r>
-            <a:endParaRPr sz="2400"/>
-          </a:p>
-        </p:txBody>
-      </p:sp>
-      <p:sp>
-        <p:nvSpPr>
-          <p:cNvPr id="155" name="Shape 155"/>
-          <p:cNvSpPr txBox="1"/>
-          <p:nvPr/>
-        </p:nvSpPr>
-        <p:spPr>
-          <a:xfrm>
-            <a:off x="460425" y="2567325"/>
-            <a:ext cx="4756800" cy="616800"/>
-          </a:xfrm>
-          <a:prstGeom prst="rect">
-            <a:avLst/>
-          </a:prstGeom>
-          <a:noFill/>
-          <a:ln>
-            <a:noFill/>
-          </a:ln>
-        </p:spPr>
-        <p:txBody>
-          <a:bodyPr anchorCtr="0" anchor="t" bIns="91425" lIns="91425" rIns="91425" wrap="square" tIns="91425">
-            <a:noAutofit/>
-          </a:bodyPr>
-          <a:lstStyle/>
-          <a:p>
-            <a:pPr lvl="0" rtl="0">
-              <a:spcBef>
-                <a:spcPts val="0"/>
-              </a:spcBef>
-              <a:buNone/>
-            </a:pPr>
-            <a:r>
-              <a:rPr lang="en">
-                <a:solidFill>
-                  <a:schemeClr val="lt1"/>
-                </a:solidFill>
-                <a:latin typeface="Old Standard TT"/>
-                <a:ea typeface="Old Standard TT"/>
-                <a:cs typeface="Old Standard TT"/>
-                <a:sym typeface="Old Standard TT"/>
-              </a:rPr>
-              <a:t>Are blacks as likely to get an interview call as whites?</a:t>
-            </a:r>
-          </a:p>
-        </p:txBody>
-      </p:sp>
-      <p:pic>
-        <p:nvPicPr>
           <p:cNvPr id="156" name="Shape 156"/>
           <p:cNvPicPr preferRelativeResize="0"/>
           <p:nvPr/>
@@ -7537,8 +7660,8 @@
         </p:blipFill>
         <p:spPr>
           <a:xfrm>
-            <a:off x="5745575" y="936900"/>
-            <a:ext cx="2857500" cy="2095500"/>
+            <a:off x="235375" y="880050"/>
+            <a:ext cx="3444675" cy="1938200"/>
           </a:xfrm>
           <a:prstGeom prst="rect">
             <a:avLst/>
@@ -7584,20 +7707,20 @@
         </p:nvSpPr>
         <p:spPr>
           <a:xfrm>
-            <a:off x="490250" y="526350"/>
-            <a:ext cx="5604000" cy="4090800"/>
+            <a:off x="460425" y="1140600"/>
+            <a:ext cx="5143200" cy="1688100"/>
           </a:xfrm>
           <a:prstGeom prst="rect">
             <a:avLst/>
           </a:prstGeom>
         </p:spPr>
         <p:txBody>
-          <a:bodyPr anchorCtr="0" anchor="ctr" bIns="91425" lIns="91425" rIns="91425" wrap="square" tIns="91425">
+          <a:bodyPr anchorCtr="0" anchor="b" bIns="91425" lIns="91425" rIns="91425" wrap="square" tIns="91425">
             <a:noAutofit/>
           </a:bodyPr>
           <a:lstStyle/>
           <a:p>
-            <a:pPr lvl="0">
+            <a:pPr lvl="0" rtl="0">
               <a:spcBef>
                 <a:spcPts val="0"/>
               </a:spcBef>
@@ -7605,11 +7728,97 @@
             </a:pPr>
             <a:r>
               <a:rPr lang="en"/>
-              <a:t>Ethics and Standards</a:t>
+              <a:t>Racial Discrimination</a:t>
+            </a:r>
+          </a:p>
+          <a:p>
+            <a:pPr lvl="0" rtl="0">
+              <a:spcBef>
+                <a:spcPts val="0"/>
+              </a:spcBef>
+              <a:buNone/>
+            </a:pPr>
+            <a:r>
+              <a:t/>
+            </a:r>
+            <a:endParaRPr sz="2400"/>
+          </a:p>
+        </p:txBody>
+      </p:sp>
+      <p:sp>
+        <p:nvSpPr>
+          <p:cNvPr id="162" name="Shape 162"/>
+          <p:cNvSpPr txBox="1"/>
+          <p:nvPr/>
+        </p:nvSpPr>
+        <p:spPr>
+          <a:xfrm>
+            <a:off x="460425" y="2567325"/>
+            <a:ext cx="4756800" cy="616800"/>
+          </a:xfrm>
+          <a:prstGeom prst="rect">
+            <a:avLst/>
+          </a:prstGeom>
+          <a:noFill/>
+          <a:ln>
+            <a:noFill/>
+          </a:ln>
+        </p:spPr>
+        <p:txBody>
+          <a:bodyPr anchorCtr="0" anchor="t" bIns="91425" lIns="91425" rIns="91425" wrap="square" tIns="91425">
+            <a:noAutofit/>
+          </a:bodyPr>
+          <a:lstStyle/>
+          <a:p>
+            <a:pPr lvl="0" rtl="0">
+              <a:spcBef>
+                <a:spcPts val="0"/>
+              </a:spcBef>
+              <a:buNone/>
+            </a:pPr>
+            <a:r>
+              <a:rPr lang="en">
+                <a:solidFill>
+                  <a:schemeClr val="lt1"/>
+                </a:solidFill>
+                <a:latin typeface="Old Standard TT"/>
+                <a:ea typeface="Old Standard TT"/>
+                <a:cs typeface="Old Standard TT"/>
+                <a:sym typeface="Old Standard TT"/>
+              </a:rPr>
+              <a:t>Are blacks as likely to get an interview call as whites?</a:t>
             </a:r>
           </a:p>
         </p:txBody>
       </p:sp>
+      <p:pic>
+        <p:nvPicPr>
+          <p:cNvPr id="163" name="Shape 163"/>
+          <p:cNvPicPr preferRelativeResize="0"/>
+          <p:nvPr/>
+        </p:nvPicPr>
+        <p:blipFill>
+          <a:blip r:embed="rId3">
+            <a:alphaModFix/>
+          </a:blip>
+          <a:stretch>
+            <a:fillRect/>
+          </a:stretch>
+        </p:blipFill>
+        <p:spPr>
+          <a:xfrm>
+            <a:off x="5745575" y="936900"/>
+            <a:ext cx="2857500" cy="2095500"/>
+          </a:xfrm>
+          <a:prstGeom prst="rect">
+            <a:avLst/>
+          </a:prstGeom>
+          <a:noFill/>
+          <a:ln>
+            <a:noFill/>
+          </a:ln>
+        </p:spPr>
+      </p:pic>
     </p:spTree>
   </p:cSld>
   <p:clrMapOvr>
@@ -7623,7 +7832,7 @@
   <p:cSld>
     <p:spTree>
       <p:nvGrpSpPr>
-        <p:cNvPr id="165" name="Shape 165"/>
+        <p:cNvPr id="167" name="Shape 167"/>
         <p:cNvGrpSpPr/>
         <p:nvPr/>
       </p:nvGrpSpPr>
@@ -7637,7 +7846,7 @@
       </p:grpSpPr>
       <p:sp>
         <p:nvSpPr>
-          <p:cNvPr id="166" name="Shape 166"/>
+          <p:cNvPr id="168" name="Shape 168"/>
           <p:cNvSpPr txBox="1"/>
           <p:nvPr>
             <p:ph type="title"/>
@@ -7645,106 +7854,12 @@
         </p:nvSpPr>
         <p:spPr>
           <a:xfrm>
-            <a:off x="311700" y="445025"/>
-            <a:ext cx="8520600" cy="613200"/>
-          </a:xfrm>
-          <a:prstGeom prst="rect">
-            <a:avLst/>
-          </a:prstGeom>
-        </p:spPr>
-        <p:txBody>
-          <a:bodyPr anchorCtr="0" anchor="t" bIns="91425" lIns="91425" rIns="91425" wrap="square" tIns="91425">
-            <a:noAutofit/>
-          </a:bodyPr>
-          <a:lstStyle/>
-          <a:p>
-            <a:pPr lvl="0">
-              <a:spcBef>
-                <a:spcPts val="0"/>
-              </a:spcBef>
-              <a:buNone/>
-            </a:pPr>
-            <a:r>
-              <a:rPr lang="en"/>
-              <a:t>Quality and Quantity</a:t>
-            </a:r>
-          </a:p>
-        </p:txBody>
-      </p:sp>
-      <p:pic>
-        <p:nvPicPr>
-          <p:cNvPr id="167" name="Shape 167"/>
-          <p:cNvPicPr preferRelativeResize="0"/>
-          <p:nvPr/>
-        </p:nvPicPr>
-        <p:blipFill>
-          <a:blip r:embed="rId3">
-            <a:alphaModFix/>
-          </a:blip>
-          <a:stretch>
-            <a:fillRect/>
-          </a:stretch>
-        </p:blipFill>
-        <p:spPr>
-          <a:xfrm>
-            <a:off x="1041000" y="1367425"/>
-            <a:ext cx="3514725" cy="3219450"/>
-          </a:xfrm>
-          <a:prstGeom prst="rect">
-            <a:avLst/>
-          </a:prstGeom>
-          <a:noFill/>
-          <a:ln>
-            <a:noFill/>
-          </a:ln>
-        </p:spPr>
-      </p:pic>
-      <p:pic>
-        <p:nvPicPr>
-          <p:cNvPr id="168" name="Shape 168"/>
-          <p:cNvPicPr preferRelativeResize="0"/>
-          <p:nvPr/>
-        </p:nvPicPr>
-        <p:blipFill>
-          <a:blip r:embed="rId4">
-            <a:alphaModFix/>
-          </a:blip>
-          <a:stretch>
-            <a:fillRect/>
-          </a:stretch>
-        </p:blipFill>
-        <p:spPr>
-          <a:xfrm>
-            <a:off x="5565375" y="1210625"/>
-            <a:ext cx="2400300" cy="3305175"/>
-          </a:xfrm>
-          <a:prstGeom prst="rect">
-            <a:avLst/>
-          </a:prstGeom>
-          <a:noFill/>
-          <a:ln>
-            <a:noFill/>
-          </a:ln>
-        </p:spPr>
-      </p:pic>
-      <p:sp>
-        <p:nvSpPr>
-          <p:cNvPr id="169" name="Shape 169"/>
-          <p:cNvSpPr txBox="1"/>
-          <p:nvPr/>
-        </p:nvSpPr>
-        <p:spPr>
-          <a:xfrm>
-            <a:off x="304800" y="304800"/>
-            <a:ext cx="3000000" cy="3000000"/>
-          </a:xfrm>
-          <a:prstGeom prst="rect">
-            <a:avLst/>
-          </a:prstGeom>
-          <a:noFill/>
-          <a:ln>
-            <a:noFill/>
-          </a:ln>
+            <a:off x="490250" y="526350"/>
+            <a:ext cx="5604000" cy="4090800"/>
+          </a:xfrm>
+          <a:prstGeom prst="rect">
+            <a:avLst/>
+          </a:prstGeom>
         </p:spPr>
         <p:txBody>
           <a:bodyPr anchorCtr="0" anchor="ctr" bIns="91425" lIns="91425" rIns="91425" wrap="square" tIns="91425">
@@ -7752,7 +7867,7 @@
           </a:bodyPr>
           <a:lstStyle/>
           <a:p>
-            <a:pPr lvl="0" rtl="0">
+            <a:pPr lvl="0">
               <a:spcBef>
                 <a:spcPts val="0"/>
               </a:spcBef>
@@ -7760,7 +7875,7 @@
             </a:pPr>
             <a:r>
               <a:rPr lang="en"/>
-              <a:t> </a:t>
+              <a:t>Ethics and Standards</a:t>
             </a:r>
           </a:p>
         </p:txBody>
@@ -7778,7 +7893,7 @@
   <p:cSld>
     <p:spTree>
       <p:nvGrpSpPr>
-        <p:cNvPr id="173" name="Shape 173"/>
+        <p:cNvPr id="172" name="Shape 172"/>
         <p:cNvGrpSpPr/>
         <p:nvPr/>
       </p:nvGrpSpPr>
@@ -7792,7 +7907,7 @@
       </p:grpSpPr>
       <p:sp>
         <p:nvSpPr>
-          <p:cNvPr id="174" name="Shape 174"/>
+          <p:cNvPr id="173" name="Shape 173"/>
           <p:cNvSpPr txBox="1"/>
           <p:nvPr>
             <p:ph type="title"/>
@@ -7800,7 +7915,7 @@
         </p:nvSpPr>
         <p:spPr>
           <a:xfrm>
-            <a:off x="311700" y="319575"/>
+            <a:off x="311700" y="445025"/>
             <a:ext cx="8520600" cy="613200"/>
           </a:xfrm>
           <a:prstGeom prst="rect">
@@ -7821,127 +7936,14 @@
             </a:pPr>
             <a:r>
               <a:rPr lang="en"/>
-              <a:t>Sampling Bias</a:t>
+              <a:t>Quality and Quantity</a:t>
             </a:r>
           </a:p>
         </p:txBody>
       </p:sp>
-      <p:sp>
-        <p:nvSpPr>
-          <p:cNvPr id="175" name="Shape 175"/>
-          <p:cNvSpPr txBox="1"/>
-          <p:nvPr>
-            <p:ph idx="1" type="body"/>
-          </p:nvPr>
-        </p:nvSpPr>
-        <p:spPr>
-          <a:xfrm>
-            <a:off x="4441125" y="1683875"/>
-            <a:ext cx="4748400" cy="3397200"/>
-          </a:xfrm>
-          <a:prstGeom prst="rect">
-            <a:avLst/>
-          </a:prstGeom>
-        </p:spPr>
-        <p:txBody>
-          <a:bodyPr anchorCtr="0" anchor="t" bIns="91425" lIns="91425" rIns="91425" wrap="square" tIns="91425">
-            <a:noAutofit/>
-          </a:bodyPr>
-          <a:lstStyle/>
-          <a:p>
-            <a:pPr indent="-342900" lvl="0" marL="457200" rtl="0">
-              <a:spcBef>
-                <a:spcPts val="0"/>
-              </a:spcBef>
-              <a:spcAft>
-                <a:spcPts val="0"/>
-              </a:spcAft>
-              <a:buSzPts val="1800"/>
-              <a:buAutoNum type="arabicPeriod"/>
-            </a:pPr>
-            <a:r>
-              <a:rPr lang="en"/>
-              <a:t>Deterministic bias​</a:t>
-            </a:r>
-          </a:p>
-          <a:p>
-            <a:pPr indent="-342900" lvl="0" marL="457200" rtl="0">
-              <a:spcBef>
-                <a:spcPts val="0"/>
-              </a:spcBef>
-              <a:spcAft>
-                <a:spcPts val="0"/>
-              </a:spcAft>
-              <a:buSzPts val="1800"/>
-              <a:buAutoNum type="arabicPeriod"/>
-            </a:pPr>
-            <a:r>
-              <a:rPr lang="en"/>
-              <a:t>Small number of observations​</a:t>
-            </a:r>
-          </a:p>
-          <a:p>
-            <a:pPr indent="-342900" lvl="0" marL="457200" rtl="0">
-              <a:spcBef>
-                <a:spcPts val="0"/>
-              </a:spcBef>
-              <a:spcAft>
-                <a:spcPts val="0"/>
-              </a:spcAft>
-              <a:buSzPts val="1800"/>
-              <a:buAutoNum type="arabicPeriod"/>
-            </a:pPr>
-            <a:r>
-              <a:rPr lang="en"/>
-              <a:t>Selection bias​</a:t>
-            </a:r>
-          </a:p>
-          <a:p>
-            <a:pPr indent="-342900" lvl="0" marL="457200" rtl="0">
-              <a:spcBef>
-                <a:spcPts val="0"/>
-              </a:spcBef>
-              <a:spcAft>
-                <a:spcPts val="0"/>
-              </a:spcAft>
-              <a:buSzPts val="1800"/>
-              <a:buAutoNum type="arabicPeriod"/>
-            </a:pPr>
-            <a:r>
-              <a:rPr lang="en"/>
-              <a:t>Confirmation bias​</a:t>
-            </a:r>
-          </a:p>
-          <a:p>
-            <a:pPr indent="-342900" lvl="0" marL="457200" rtl="0">
-              <a:spcBef>
-                <a:spcPts val="0"/>
-              </a:spcBef>
-              <a:buSzPts val="1800"/>
-              <a:buAutoNum type="arabicPeriod"/>
-            </a:pPr>
-            <a:r>
-              <a:rPr lang="en"/>
-              <a:t>Inaccuracy</a:t>
-            </a:r>
-          </a:p>
-          <a:p>
-            <a:pPr lvl="0">
-              <a:spcBef>
-                <a:spcPts val="0"/>
-              </a:spcBef>
-              <a:buNone/>
-            </a:pPr>
-            <a:r>
-              <a:t/>
-            </a:r>
-            <a:endParaRPr/>
-          </a:p>
-        </p:txBody>
-      </p:sp>
       <p:pic>
         <p:nvPicPr>
-          <p:cNvPr id="176" name="Shape 176"/>
+          <p:cNvPr id="174" name="Shape 174"/>
           <p:cNvPicPr preferRelativeResize="0"/>
           <p:nvPr/>
         </p:nvPicPr>
@@ -7955,8 +7957,8 @@
         </p:blipFill>
         <p:spPr>
           <a:xfrm>
-            <a:off x="152400" y="1210625"/>
-            <a:ext cx="3937701" cy="3284699"/>
+            <a:off x="1041000" y="1367425"/>
+            <a:ext cx="3514725" cy="3219450"/>
           </a:xfrm>
           <a:prstGeom prst="rect">
             <a:avLst/>
@@ -7967,6 +7969,72 @@
           </a:ln>
         </p:spPr>
       </p:pic>
+      <p:pic>
+        <p:nvPicPr>
+          <p:cNvPr id="175" name="Shape 175"/>
+          <p:cNvPicPr preferRelativeResize="0"/>
+          <p:nvPr/>
+        </p:nvPicPr>
+        <p:blipFill>
+          <a:blip r:embed="rId4">
+            <a:alphaModFix/>
+          </a:blip>
+          <a:stretch>
+            <a:fillRect/>
+          </a:stretch>
+        </p:blipFill>
+        <p:spPr>
+          <a:xfrm>
+            <a:off x="5565375" y="1210625"/>
+            <a:ext cx="2400300" cy="3305175"/>
+          </a:xfrm>
+          <a:prstGeom prst="rect">
+            <a:avLst/>
+          </a:prstGeom>
+          <a:noFill/>
+          <a:ln>
+            <a:noFill/>
+          </a:ln>
+        </p:spPr>
+      </p:pic>
+      <p:sp>
+        <p:nvSpPr>
+          <p:cNvPr id="176" name="Shape 176"/>
+          <p:cNvSpPr txBox="1"/>
+          <p:nvPr/>
+        </p:nvSpPr>
+        <p:spPr>
+          <a:xfrm>
+            <a:off x="304800" y="304800"/>
+            <a:ext cx="3000000" cy="3000000"/>
+          </a:xfrm>
+          <a:prstGeom prst="rect">
+            <a:avLst/>
+          </a:prstGeom>
+          <a:noFill/>
+          <a:ln>
+            <a:noFill/>
+          </a:ln>
+        </p:spPr>
+        <p:txBody>
+          <a:bodyPr anchorCtr="0" anchor="ctr" bIns="91425" lIns="91425" rIns="91425" wrap="square" tIns="91425">
+            <a:noAutofit/>
+          </a:bodyPr>
+          <a:lstStyle/>
+          <a:p>
+            <a:pPr lvl="0" rtl="0">
+              <a:spcBef>
+                <a:spcPts val="0"/>
+              </a:spcBef>
+              <a:buNone/>
+            </a:pPr>
+            <a:r>
+              <a:rPr lang="en"/>
+              <a:t> </a:t>
+            </a:r>
+          </a:p>
+        </p:txBody>
+      </p:sp>
     </p:spTree>
   </p:cSld>
   <p:clrMapOvr>
@@ -8002,7 +8070,7 @@
         </p:nvSpPr>
         <p:spPr>
           <a:xfrm>
-            <a:off x="311700" y="445025"/>
+            <a:off x="311700" y="319575"/>
             <a:ext cx="8520600" cy="613200"/>
           </a:xfrm>
           <a:prstGeom prst="rect">
@@ -8023,14 +8091,127 @@
             </a:pPr>
             <a:r>
               <a:rPr lang="en"/>
-              <a:t>Statistical and Practical Significance</a:t>
+              <a:t>Sampling Bias</a:t>
             </a:r>
           </a:p>
         </p:txBody>
       </p:sp>
+      <p:sp>
+        <p:nvSpPr>
+          <p:cNvPr id="182" name="Shape 182"/>
+          <p:cNvSpPr txBox="1"/>
+          <p:nvPr>
+            <p:ph idx="1" type="body"/>
+          </p:nvPr>
+        </p:nvSpPr>
+        <p:spPr>
+          <a:xfrm>
+            <a:off x="4441125" y="1683875"/>
+            <a:ext cx="4748400" cy="3397200"/>
+          </a:xfrm>
+          <a:prstGeom prst="rect">
+            <a:avLst/>
+          </a:prstGeom>
+        </p:spPr>
+        <p:txBody>
+          <a:bodyPr anchorCtr="0" anchor="t" bIns="91425" lIns="91425" rIns="91425" wrap="square" tIns="91425">
+            <a:noAutofit/>
+          </a:bodyPr>
+          <a:lstStyle/>
+          <a:p>
+            <a:pPr indent="-342900" lvl="0" marL="457200" rtl="0">
+              <a:spcBef>
+                <a:spcPts val="0"/>
+              </a:spcBef>
+              <a:spcAft>
+                <a:spcPts val="0"/>
+              </a:spcAft>
+              <a:buSzPts val="1800"/>
+              <a:buAutoNum type="arabicPeriod"/>
+            </a:pPr>
+            <a:r>
+              <a:rPr lang="en"/>
+              <a:t>Deterministic bias​</a:t>
+            </a:r>
+          </a:p>
+          <a:p>
+            <a:pPr indent="-342900" lvl="0" marL="457200" rtl="0">
+              <a:spcBef>
+                <a:spcPts val="0"/>
+              </a:spcBef>
+              <a:spcAft>
+                <a:spcPts val="0"/>
+              </a:spcAft>
+              <a:buSzPts val="1800"/>
+              <a:buAutoNum type="arabicPeriod"/>
+            </a:pPr>
+            <a:r>
+              <a:rPr lang="en"/>
+              <a:t>Small number of observations​</a:t>
+            </a:r>
+          </a:p>
+          <a:p>
+            <a:pPr indent="-342900" lvl="0" marL="457200" rtl="0">
+              <a:spcBef>
+                <a:spcPts val="0"/>
+              </a:spcBef>
+              <a:spcAft>
+                <a:spcPts val="0"/>
+              </a:spcAft>
+              <a:buSzPts val="1800"/>
+              <a:buAutoNum type="arabicPeriod"/>
+            </a:pPr>
+            <a:r>
+              <a:rPr lang="en"/>
+              <a:t>Selection bias​</a:t>
+            </a:r>
+          </a:p>
+          <a:p>
+            <a:pPr indent="-342900" lvl="0" marL="457200" rtl="0">
+              <a:spcBef>
+                <a:spcPts val="0"/>
+              </a:spcBef>
+              <a:spcAft>
+                <a:spcPts val="0"/>
+              </a:spcAft>
+              <a:buSzPts val="1800"/>
+              <a:buAutoNum type="arabicPeriod"/>
+            </a:pPr>
+            <a:r>
+              <a:rPr lang="en"/>
+              <a:t>Confirmation bias​</a:t>
+            </a:r>
+          </a:p>
+          <a:p>
+            <a:pPr indent="-342900" lvl="0" marL="457200" rtl="0">
+              <a:spcBef>
+                <a:spcPts val="0"/>
+              </a:spcBef>
+              <a:buSzPts val="1800"/>
+              <a:buAutoNum type="arabicPeriod"/>
+            </a:pPr>
+            <a:r>
+              <a:rPr lang="en"/>
+              <a:t>Inaccuracy</a:t>
+            </a:r>
+          </a:p>
+          <a:p>
+            <a:pPr lvl="0">
+              <a:spcBef>
+                <a:spcPts val="0"/>
+              </a:spcBef>
+              <a:buNone/>
+            </a:pPr>
+            <a:r>
+              <a:t/>
+            </a:r>
+            <a:endParaRPr/>
+          </a:p>
+        </p:txBody>
+      </p:sp>
       <p:pic>
         <p:nvPicPr>
-          <p:cNvPr id="182" name="Shape 182"/>
+          <p:cNvPr id="183" name="Shape 183"/>
           <p:cNvPicPr preferRelativeResize="0"/>
           <p:nvPr/>
         </p:nvPicPr>
@@ -8044,8 +8225,8 @@
         </p:blipFill>
         <p:spPr>
           <a:xfrm>
-            <a:off x="607475" y="1438250"/>
-            <a:ext cx="4327050" cy="2937650"/>
+            <a:off x="152400" y="1210625"/>
+            <a:ext cx="3937701" cy="3284699"/>
           </a:xfrm>
           <a:prstGeom prst="rect">
             <a:avLst/>
@@ -8056,72 +8237,6 @@
           </a:ln>
         </p:spPr>
       </p:pic>
-      <p:pic>
-        <p:nvPicPr>
-          <p:cNvPr id="183" name="Shape 183"/>
-          <p:cNvPicPr preferRelativeResize="0"/>
-          <p:nvPr/>
-        </p:nvPicPr>
-        <p:blipFill>
-          <a:blip r:embed="rId4">
-            <a:alphaModFix/>
-          </a:blip>
-          <a:stretch>
-            <a:fillRect/>
-          </a:stretch>
-        </p:blipFill>
-        <p:spPr>
-          <a:xfrm>
-            <a:off x="5703700" y="1640238"/>
-            <a:ext cx="2028825" cy="2533650"/>
-          </a:xfrm>
-          <a:prstGeom prst="rect">
-            <a:avLst/>
-          </a:prstGeom>
-          <a:noFill/>
-          <a:ln>
-            <a:noFill/>
-          </a:ln>
-        </p:spPr>
-      </p:pic>
-      <p:sp>
-        <p:nvSpPr>
-          <p:cNvPr id="184" name="Shape 184"/>
-          <p:cNvSpPr txBox="1"/>
-          <p:nvPr/>
-        </p:nvSpPr>
-        <p:spPr>
-          <a:xfrm>
-            <a:off x="1883375" y="852013"/>
-            <a:ext cx="3000000" cy="3000000"/>
-          </a:xfrm>
-          <a:prstGeom prst="rect">
-            <a:avLst/>
-          </a:prstGeom>
-          <a:noFill/>
-          <a:ln>
-            <a:noFill/>
-          </a:ln>
-        </p:spPr>
-        <p:txBody>
-          <a:bodyPr anchorCtr="0" anchor="ctr" bIns="91425" lIns="91425" rIns="91425" wrap="square" tIns="91425">
-            <a:noAutofit/>
-          </a:bodyPr>
-          <a:lstStyle/>
-          <a:p>
-            <a:pPr lvl="0" rtl="0">
-              <a:spcBef>
-                <a:spcPts val="0"/>
-              </a:spcBef>
-              <a:buNone/>
-            </a:pPr>
-            <a:r>
-              <a:rPr lang="en"/>
-              <a:t> </a:t>
-            </a:r>
-          </a:p>
-        </p:txBody>
-      </p:sp>
     </p:spTree>
   </p:cSld>
   <p:clrMapOvr>
@@ -8157,33 +8272,28 @@
         </p:nvSpPr>
         <p:spPr>
           <a:xfrm>
-            <a:off x="470925" y="245975"/>
-            <a:ext cx="8046900" cy="1122900"/>
+            <a:off x="311700" y="445025"/>
+            <a:ext cx="8520600" cy="613200"/>
           </a:xfrm>
           <a:prstGeom prst="rect">
             <a:avLst/>
           </a:prstGeom>
         </p:spPr>
         <p:txBody>
-          <a:bodyPr anchorCtr="0" anchor="ctr" bIns="91425" lIns="91425" rIns="91425" wrap="square" tIns="91425">
+          <a:bodyPr anchorCtr="0" anchor="t" bIns="91425" lIns="91425" rIns="91425" wrap="square" tIns="91425">
             <a:noAutofit/>
           </a:bodyPr>
           <a:lstStyle/>
           <a:p>
-            <a:pPr lvl="0" algn="ctr">
+            <a:pPr lvl="0">
               <a:spcBef>
                 <a:spcPts val="0"/>
               </a:spcBef>
               <a:buNone/>
             </a:pPr>
             <a:r>
-              <a:rPr lang="en" sz="2400">
-                <a:solidFill>
-                  <a:srgbClr val="F3F3F3"/>
-                </a:solidFill>
-                <a:hlinkClick r:id="rId3"/>
-              </a:rPr>
-              <a:t>github.com/rounakbanik/inferential_stats_pycon</a:t>
+              <a:rPr lang="en"/>
+              <a:t>Acknowledgements</a:t>
             </a:r>
           </a:p>
         </p:txBody>
@@ -8191,6 +8301,34 @@
       <p:pic>
         <p:nvPicPr>
           <p:cNvPr id="67" name="Shape 67"/>
+          <p:cNvPicPr preferRelativeResize="0"/>
+          <p:nvPr/>
+        </p:nvPicPr>
+        <p:blipFill>
+          <a:blip r:embed="rId3">
+            <a:alphaModFix/>
+          </a:blip>
+          <a:stretch>
+            <a:fillRect/>
+          </a:stretch>
+        </p:blipFill>
+        <p:spPr>
+          <a:xfrm>
+            <a:off x="83375" y="1703825"/>
+            <a:ext cx="4628725" cy="2057200"/>
+          </a:xfrm>
+          <a:prstGeom prst="rect">
+            <a:avLst/>
+          </a:prstGeom>
+          <a:noFill/>
+          <a:ln>
+            <a:noFill/>
+          </a:ln>
+        </p:spPr>
+      </p:pic>
+      <p:pic>
+        <p:nvPicPr>
+          <p:cNvPr id="68" name="Shape 68"/>
           <p:cNvPicPr preferRelativeResize="0"/>
           <p:nvPr/>
         </p:nvPicPr>
@@ -8204,8 +8342,8 @@
         </p:blipFill>
         <p:spPr>
           <a:xfrm>
-            <a:off x="323401" y="1368875"/>
-            <a:ext cx="8497199" cy="3363475"/>
+            <a:off x="4712100" y="1221707"/>
+            <a:ext cx="3967475" cy="2700087"/>
           </a:xfrm>
           <a:prstGeom prst="rect">
             <a:avLst/>
@@ -8229,7 +8367,7 @@
   <p:cSld>
     <p:spTree>
       <p:nvGrpSpPr>
-        <p:cNvPr id="188" name="Shape 188"/>
+        <p:cNvPr id="187" name="Shape 187"/>
         <p:cNvGrpSpPr/>
         <p:nvPr/>
       </p:nvGrpSpPr>
@@ -8243,7 +8381,7 @@
       </p:grpSpPr>
       <p:sp>
         <p:nvSpPr>
-          <p:cNvPr id="189" name="Shape 189"/>
+          <p:cNvPr id="188" name="Shape 188"/>
           <p:cNvSpPr txBox="1"/>
           <p:nvPr>
             <p:ph type="title"/>
@@ -8272,14 +8410,14 @@
             </a:pPr>
             <a:r>
               <a:rPr lang="en"/>
-              <a:t>Further Reading</a:t>
+              <a:t>Statistical and Practical Significance</a:t>
             </a:r>
           </a:p>
         </p:txBody>
       </p:sp>
       <p:pic>
         <p:nvPicPr>
-          <p:cNvPr id="190" name="Shape 190"/>
+          <p:cNvPr id="189" name="Shape 189"/>
           <p:cNvPicPr preferRelativeResize="0"/>
           <p:nvPr/>
         </p:nvPicPr>
@@ -8293,8 +8431,8 @@
         </p:blipFill>
         <p:spPr>
           <a:xfrm>
-            <a:off x="785288" y="1545150"/>
-            <a:ext cx="2409341" cy="2694300"/>
+            <a:off x="607475" y="1438250"/>
+            <a:ext cx="4327050" cy="2937650"/>
           </a:xfrm>
           <a:prstGeom prst="rect">
             <a:avLst/>
@@ -8307,7 +8445,7 @@
       </p:pic>
       <p:pic>
         <p:nvPicPr>
-          <p:cNvPr id="191" name="Shape 191"/>
+          <p:cNvPr id="190" name="Shape 190"/>
           <p:cNvPicPr preferRelativeResize="0"/>
           <p:nvPr/>
         </p:nvPicPr>
@@ -8321,8 +8459,8 @@
         </p:blipFill>
         <p:spPr>
           <a:xfrm>
-            <a:off x="3329417" y="1545150"/>
-            <a:ext cx="2666836" cy="2851649"/>
+            <a:off x="5703700" y="1640238"/>
+            <a:ext cx="2028825" cy="2533650"/>
           </a:xfrm>
           <a:prstGeom prst="rect">
             <a:avLst/>
@@ -8333,24 +8471,16 @@
           </a:ln>
         </p:spPr>
       </p:pic>
-      <p:pic>
-        <p:nvPicPr>
-          <p:cNvPr id="192" name="Shape 192"/>
-          <p:cNvPicPr preferRelativeResize="0"/>
+      <p:sp>
+        <p:nvSpPr>
+          <p:cNvPr id="191" name="Shape 191"/>
+          <p:cNvSpPr txBox="1"/>
           <p:nvPr/>
-        </p:nvPicPr>
-        <p:blipFill>
-          <a:blip r:embed="rId5">
-            <a:alphaModFix/>
-          </a:blip>
-          <a:stretch>
-            <a:fillRect/>
-          </a:stretch>
-        </p:blipFill>
-        <p:spPr>
-          <a:xfrm>
-            <a:off x="6131042" y="1545150"/>
-            <a:ext cx="2227671" cy="2851650"/>
+        </p:nvSpPr>
+        <p:spPr>
+          <a:xfrm>
+            <a:off x="1883375" y="852013"/>
+            <a:ext cx="3000000" cy="3000000"/>
           </a:xfrm>
           <a:prstGeom prst="rect">
             <a:avLst/>
@@ -8360,7 +8490,25 @@
             <a:noFill/>
           </a:ln>
         </p:spPr>
-      </p:pic>
+        <p:txBody>
+          <a:bodyPr anchorCtr="0" anchor="ctr" bIns="91425" lIns="91425" rIns="91425" wrap="square" tIns="91425">
+            <a:noAutofit/>
+          </a:bodyPr>
+          <a:lstStyle/>
+          <a:p>
+            <a:pPr lvl="0" rtl="0">
+              <a:spcBef>
+                <a:spcPts val="0"/>
+              </a:spcBef>
+              <a:buNone/>
+            </a:pPr>
+            <a:r>
+              <a:rPr lang="en"/>
+              <a:t> </a:t>
+            </a:r>
+          </a:p>
+        </p:txBody>
+      </p:sp>
     </p:spTree>
   </p:cSld>
   <p:clrMapOvr>
@@ -8374,7 +8522,7 @@
   <p:cSld>
     <p:spTree>
       <p:nvGrpSpPr>
-        <p:cNvPr id="196" name="Shape 196"/>
+        <p:cNvPr id="195" name="Shape 195"/>
         <p:cNvGrpSpPr/>
         <p:nvPr/>
       </p:nvGrpSpPr>
@@ -8388,7 +8536,152 @@
       </p:grpSpPr>
       <p:sp>
         <p:nvSpPr>
+          <p:cNvPr id="196" name="Shape 196"/>
+          <p:cNvSpPr txBox="1"/>
+          <p:nvPr>
+            <p:ph type="title"/>
+          </p:nvPr>
+        </p:nvSpPr>
+        <p:spPr>
+          <a:xfrm>
+            <a:off x="311700" y="445025"/>
+            <a:ext cx="8520600" cy="613200"/>
+          </a:xfrm>
+          <a:prstGeom prst="rect">
+            <a:avLst/>
+          </a:prstGeom>
+        </p:spPr>
+        <p:txBody>
+          <a:bodyPr anchorCtr="0" anchor="t" bIns="91425" lIns="91425" rIns="91425" wrap="square" tIns="91425">
+            <a:noAutofit/>
+          </a:bodyPr>
+          <a:lstStyle/>
+          <a:p>
+            <a:pPr lvl="0">
+              <a:spcBef>
+                <a:spcPts val="0"/>
+              </a:spcBef>
+              <a:buNone/>
+            </a:pPr>
+            <a:r>
+              <a:rPr lang="en"/>
+              <a:t>Further Reading</a:t>
+            </a:r>
+          </a:p>
+        </p:txBody>
+      </p:sp>
+      <p:pic>
+        <p:nvPicPr>
           <p:cNvPr id="197" name="Shape 197"/>
+          <p:cNvPicPr preferRelativeResize="0"/>
+          <p:nvPr/>
+        </p:nvPicPr>
+        <p:blipFill>
+          <a:blip r:embed="rId3">
+            <a:alphaModFix/>
+          </a:blip>
+          <a:stretch>
+            <a:fillRect/>
+          </a:stretch>
+        </p:blipFill>
+        <p:spPr>
+          <a:xfrm>
+            <a:off x="785288" y="1545150"/>
+            <a:ext cx="2409341" cy="2694300"/>
+          </a:xfrm>
+          <a:prstGeom prst="rect">
+            <a:avLst/>
+          </a:prstGeom>
+          <a:noFill/>
+          <a:ln>
+            <a:noFill/>
+          </a:ln>
+        </p:spPr>
+      </p:pic>
+      <p:pic>
+        <p:nvPicPr>
+          <p:cNvPr id="198" name="Shape 198"/>
+          <p:cNvPicPr preferRelativeResize="0"/>
+          <p:nvPr/>
+        </p:nvPicPr>
+        <p:blipFill>
+          <a:blip r:embed="rId4">
+            <a:alphaModFix/>
+          </a:blip>
+          <a:stretch>
+            <a:fillRect/>
+          </a:stretch>
+        </p:blipFill>
+        <p:spPr>
+          <a:xfrm>
+            <a:off x="3329417" y="1545150"/>
+            <a:ext cx="2666836" cy="2851649"/>
+          </a:xfrm>
+          <a:prstGeom prst="rect">
+            <a:avLst/>
+          </a:prstGeom>
+          <a:noFill/>
+          <a:ln>
+            <a:noFill/>
+          </a:ln>
+        </p:spPr>
+      </p:pic>
+      <p:pic>
+        <p:nvPicPr>
+          <p:cNvPr id="199" name="Shape 199"/>
+          <p:cNvPicPr preferRelativeResize="0"/>
+          <p:nvPr/>
+        </p:nvPicPr>
+        <p:blipFill>
+          <a:blip r:embed="rId5">
+            <a:alphaModFix/>
+          </a:blip>
+          <a:stretch>
+            <a:fillRect/>
+          </a:stretch>
+        </p:blipFill>
+        <p:spPr>
+          <a:xfrm>
+            <a:off x="6131042" y="1545150"/>
+            <a:ext cx="2227671" cy="2851650"/>
+          </a:xfrm>
+          <a:prstGeom prst="rect">
+            <a:avLst/>
+          </a:prstGeom>
+          <a:noFill/>
+          <a:ln>
+            <a:noFill/>
+          </a:ln>
+        </p:spPr>
+      </p:pic>
+    </p:spTree>
+  </p:cSld>
+  <p:clrMapOvr>
+    <a:masterClrMapping/>
+  </p:clrMapOvr>
+</p:sld>
+</file>
+
+<file path=ppt/slides/slide22.xml><?xml version="1.0" encoding="utf-8"?>
+<p:sld xmlns:a="http://schemas.openxmlformats.org/drawingml/2006/main" xmlns:r="http://schemas.openxmlformats.org/officeDocument/2006/relationships" xmlns:mc="http://schemas.openxmlformats.org/markup-compatibility/2006" xmlns:mv="urn:schemas-microsoft-com:mac:vml" xmlns:p="http://schemas.openxmlformats.org/presentationml/2006/main" xmlns:c="http://schemas.openxmlformats.org/drawingml/2006/chart" xmlns:dgm="http://schemas.openxmlformats.org/drawingml/2006/diagram" xmlns:o="urn:schemas-microsoft-com:office:office" xmlns:v="urn:schemas-microsoft-com:vml" xmlns:pvml="urn:schemas-microsoft-com:office:powerpoint" xmlns:com="http://schemas.openxmlformats.org/drawingml/2006/compatibility" xmlns:p14="http://schemas.microsoft.com/office/powerpoint/2010/main" xmlns:p15="http://schemas.microsoft.com/office/powerpoint/2012/main">
+  <p:cSld>
+    <p:spTree>
+      <p:nvGrpSpPr>
+        <p:cNvPr id="203" name="Shape 203"/>
+        <p:cNvGrpSpPr/>
+        <p:nvPr/>
+      </p:nvGrpSpPr>
+      <p:grpSpPr>
+        <a:xfrm>
+          <a:off x="0" y="0"/>
+          <a:ext cx="0" cy="0"/>
+          <a:chOff x="0" y="0"/>
+          <a:chExt cx="0" cy="0"/>
+        </a:xfrm>
+      </p:grpSpPr>
+      <p:sp>
+        <p:nvSpPr>
+          <p:cNvPr id="204" name="Shape 204"/>
           <p:cNvSpPr txBox="1"/>
           <p:nvPr>
             <p:ph type="ctrTitle"/>
@@ -8424,7 +8717,7 @@
       </p:sp>
       <p:sp>
         <p:nvSpPr>
-          <p:cNvPr id="198" name="Shape 198"/>
+          <p:cNvPr id="205" name="Shape 205"/>
           <p:cNvSpPr txBox="1"/>
           <p:nvPr>
             <p:ph idx="1" type="subTitle"/>
@@ -8495,7 +8788,7 @@
   <p:cSld>
     <p:spTree>
       <p:nvGrpSpPr>
-        <p:cNvPr id="71" name="Shape 71"/>
+        <p:cNvPr id="72" name="Shape 72"/>
         <p:cNvGrpSpPr/>
         <p:nvPr/>
       </p:nvGrpSpPr>
@@ -8509,7 +8802,101 @@
       </p:grpSpPr>
       <p:sp>
         <p:nvSpPr>
-          <p:cNvPr id="72" name="Shape 72"/>
+          <p:cNvPr id="73" name="Shape 73"/>
+          <p:cNvSpPr txBox="1"/>
+          <p:nvPr>
+            <p:ph type="title"/>
+          </p:nvPr>
+        </p:nvSpPr>
+        <p:spPr>
+          <a:xfrm>
+            <a:off x="470925" y="245975"/>
+            <a:ext cx="8046900" cy="1122900"/>
+          </a:xfrm>
+          <a:prstGeom prst="rect">
+            <a:avLst/>
+          </a:prstGeom>
+        </p:spPr>
+        <p:txBody>
+          <a:bodyPr anchorCtr="0" anchor="ctr" bIns="91425" lIns="91425" rIns="91425" wrap="square" tIns="91425">
+            <a:noAutofit/>
+          </a:bodyPr>
+          <a:lstStyle/>
+          <a:p>
+            <a:pPr lvl="0" algn="ctr">
+              <a:spcBef>
+                <a:spcPts val="0"/>
+              </a:spcBef>
+              <a:buNone/>
+            </a:pPr>
+            <a:r>
+              <a:rPr lang="en" sz="2400">
+                <a:solidFill>
+                  <a:srgbClr val="F3F3F3"/>
+                </a:solidFill>
+                <a:hlinkClick r:id="rId3"/>
+              </a:rPr>
+              <a:t>github.com/rounakbanik/inferential_stats_pycon</a:t>
+            </a:r>
+          </a:p>
+        </p:txBody>
+      </p:sp>
+      <p:pic>
+        <p:nvPicPr>
+          <p:cNvPr id="74" name="Shape 74"/>
+          <p:cNvPicPr preferRelativeResize="0"/>
+          <p:nvPr/>
+        </p:nvPicPr>
+        <p:blipFill>
+          <a:blip r:embed="rId4">
+            <a:alphaModFix/>
+          </a:blip>
+          <a:stretch>
+            <a:fillRect/>
+          </a:stretch>
+        </p:blipFill>
+        <p:spPr>
+          <a:xfrm>
+            <a:off x="323401" y="1368875"/>
+            <a:ext cx="8497199" cy="3363475"/>
+          </a:xfrm>
+          <a:prstGeom prst="rect">
+            <a:avLst/>
+          </a:prstGeom>
+          <a:noFill/>
+          <a:ln>
+            <a:noFill/>
+          </a:ln>
+        </p:spPr>
+      </p:pic>
+    </p:spTree>
+  </p:cSld>
+  <p:clrMapOvr>
+    <a:masterClrMapping/>
+  </p:clrMapOvr>
+</p:sld>
+</file>
+
+<file path=ppt/slides/slide4.xml><?xml version="1.0" encoding="utf-8"?>
+<p:sld xmlns:a="http://schemas.openxmlformats.org/drawingml/2006/main" xmlns:r="http://schemas.openxmlformats.org/officeDocument/2006/relationships" xmlns:mc="http://schemas.openxmlformats.org/markup-compatibility/2006" xmlns:mv="urn:schemas-microsoft-com:mac:vml" xmlns:p="http://schemas.openxmlformats.org/presentationml/2006/main" xmlns:c="http://schemas.openxmlformats.org/drawingml/2006/chart" xmlns:dgm="http://schemas.openxmlformats.org/drawingml/2006/diagram" xmlns:o="urn:schemas-microsoft-com:office:office" xmlns:v="urn:schemas-microsoft-com:vml" xmlns:pvml="urn:schemas-microsoft-com:office:powerpoint" xmlns:com="http://schemas.openxmlformats.org/drawingml/2006/compatibility" xmlns:p14="http://schemas.microsoft.com/office/powerpoint/2010/main" xmlns:p15="http://schemas.microsoft.com/office/powerpoint/2012/main">
+  <p:cSld>
+    <p:spTree>
+      <p:nvGrpSpPr>
+        <p:cNvPr id="78" name="Shape 78"/>
+        <p:cNvGrpSpPr/>
+        <p:nvPr/>
+      </p:nvGrpSpPr>
+      <p:grpSpPr>
+        <a:xfrm>
+          <a:off x="0" y="0"/>
+          <a:ext cx="0" cy="0"/>
+          <a:chOff x="0" y="0"/>
+          <a:chExt cx="0" cy="0"/>
+        </a:xfrm>
+      </p:grpSpPr>
+      <p:sp>
+        <p:nvSpPr>
+          <p:cNvPr id="79" name="Shape 79"/>
           <p:cNvSpPr txBox="1"/>
           <p:nvPr>
             <p:ph type="title"/>
@@ -8545,7 +8932,7 @@
       </p:sp>
       <p:sp>
         <p:nvSpPr>
-          <p:cNvPr id="73" name="Shape 73"/>
+          <p:cNvPr id="80" name="Shape 80"/>
           <p:cNvSpPr txBox="1"/>
           <p:nvPr>
             <p:ph idx="1" type="body"/>
@@ -8664,12 +9051,12 @@
 </p:sld>
 </file>
 
-<file path=ppt/slides/slide4.xml><?xml version="1.0" encoding="utf-8"?>
+<file path=ppt/slides/slide5.xml><?xml version="1.0" encoding="utf-8"?>
 <p:sld xmlns:a="http://schemas.openxmlformats.org/drawingml/2006/main" xmlns:r="http://schemas.openxmlformats.org/officeDocument/2006/relationships" xmlns:mc="http://schemas.openxmlformats.org/markup-compatibility/2006" xmlns:mv="urn:schemas-microsoft-com:mac:vml" xmlns:p="http://schemas.openxmlformats.org/presentationml/2006/main" xmlns:c="http://schemas.openxmlformats.org/drawingml/2006/chart" xmlns:dgm="http://schemas.openxmlformats.org/drawingml/2006/diagram" xmlns:o="urn:schemas-microsoft-com:office:office" xmlns:v="urn:schemas-microsoft-com:vml" xmlns:pvml="urn:schemas-microsoft-com:office:powerpoint" xmlns:com="http://schemas.openxmlformats.org/drawingml/2006/compatibility" xmlns:p14="http://schemas.microsoft.com/office/powerpoint/2010/main" xmlns:p15="http://schemas.microsoft.com/office/powerpoint/2012/main">
   <p:cSld>
     <p:spTree>
       <p:nvGrpSpPr>
-        <p:cNvPr id="77" name="Shape 77"/>
+        <p:cNvPr id="84" name="Shape 84"/>
         <p:cNvGrpSpPr/>
         <p:nvPr/>
       </p:nvGrpSpPr>
@@ -8683,7 +9070,7 @@
       </p:grpSpPr>
       <p:sp>
         <p:nvSpPr>
-          <p:cNvPr id="78" name="Shape 78"/>
+          <p:cNvPr id="85" name="Shape 85"/>
           <p:cNvSpPr txBox="1"/>
           <p:nvPr>
             <p:ph type="title"/>
@@ -8719,7 +9106,7 @@
       </p:sp>
       <p:pic>
         <p:nvPicPr>
-          <p:cNvPr id="79" name="Shape 79"/>
+          <p:cNvPr id="86" name="Shape 86"/>
           <p:cNvPicPr preferRelativeResize="0"/>
           <p:nvPr/>
         </p:nvPicPr>
@@ -8747,7 +9134,7 @@
       </p:pic>
       <p:sp>
         <p:nvSpPr>
-          <p:cNvPr id="80" name="Shape 80"/>
+          <p:cNvPr id="87" name="Shape 87"/>
           <p:cNvSpPr/>
           <p:nvPr/>
         </p:nvSpPr>
@@ -8791,7 +9178,7 @@
       </p:sp>
       <p:sp>
         <p:nvSpPr>
-          <p:cNvPr id="81" name="Shape 81"/>
+          <p:cNvPr id="88" name="Shape 88"/>
           <p:cNvSpPr/>
           <p:nvPr/>
         </p:nvSpPr>
@@ -8833,95 +9220,6 @@
           </a:p>
         </p:txBody>
       </p:sp>
-    </p:spTree>
-  </p:cSld>
-  <p:clrMapOvr>
-    <a:masterClrMapping/>
-  </p:clrMapOvr>
-</p:sld>
-</file>
-
-<file path=ppt/slides/slide5.xml><?xml version="1.0" encoding="utf-8"?>
-<p:sld xmlns:a="http://schemas.openxmlformats.org/drawingml/2006/main" xmlns:r="http://schemas.openxmlformats.org/officeDocument/2006/relationships" xmlns:mc="http://schemas.openxmlformats.org/markup-compatibility/2006" xmlns:mv="urn:schemas-microsoft-com:mac:vml" xmlns:p="http://schemas.openxmlformats.org/presentationml/2006/main" xmlns:c="http://schemas.openxmlformats.org/drawingml/2006/chart" xmlns:dgm="http://schemas.openxmlformats.org/drawingml/2006/diagram" xmlns:o="urn:schemas-microsoft-com:office:office" xmlns:v="urn:schemas-microsoft-com:vml" xmlns:pvml="urn:schemas-microsoft-com:office:powerpoint" xmlns:com="http://schemas.openxmlformats.org/drawingml/2006/compatibility" xmlns:p14="http://schemas.microsoft.com/office/powerpoint/2010/main" xmlns:p15="http://schemas.microsoft.com/office/powerpoint/2012/main">
-  <p:cSld>
-    <p:spTree>
-      <p:nvGrpSpPr>
-        <p:cNvPr id="85" name="Shape 85"/>
-        <p:cNvGrpSpPr/>
-        <p:nvPr/>
-      </p:nvGrpSpPr>
-      <p:grpSpPr>
-        <a:xfrm>
-          <a:off x="0" y="0"/>
-          <a:ext cx="0" cy="0"/>
-          <a:chOff x="0" y="0"/>
-          <a:chExt cx="0" cy="0"/>
-        </a:xfrm>
-      </p:grpSpPr>
-      <p:sp>
-        <p:nvSpPr>
-          <p:cNvPr id="86" name="Shape 86"/>
-          <p:cNvSpPr txBox="1"/>
-          <p:nvPr>
-            <p:ph type="title"/>
-          </p:nvPr>
-        </p:nvSpPr>
-        <p:spPr>
-          <a:xfrm>
-            <a:off x="490250" y="526350"/>
-            <a:ext cx="5604000" cy="4090800"/>
-          </a:xfrm>
-          <a:prstGeom prst="rect">
-            <a:avLst/>
-          </a:prstGeom>
-        </p:spPr>
-        <p:txBody>
-          <a:bodyPr anchorCtr="0" anchor="ctr" bIns="91425" lIns="91425" rIns="91425" wrap="square" tIns="91425">
-            <a:noAutofit/>
-          </a:bodyPr>
-          <a:lstStyle/>
-          <a:p>
-            <a:pPr lvl="0">
-              <a:spcBef>
-                <a:spcPts val="0"/>
-              </a:spcBef>
-              <a:buNone/>
-            </a:pPr>
-            <a:r>
-              <a:rPr lang="en"/>
-              <a:t>Sampling</a:t>
-            </a:r>
-          </a:p>
-        </p:txBody>
-      </p:sp>
-      <p:pic>
-        <p:nvPicPr>
-          <p:cNvPr id="87" name="Shape 87"/>
-          <p:cNvPicPr preferRelativeResize="0"/>
-          <p:nvPr/>
-        </p:nvPicPr>
-        <p:blipFill>
-          <a:blip r:embed="rId3">
-            <a:alphaModFix/>
-          </a:blip>
-          <a:stretch>
-            <a:fillRect/>
-          </a:stretch>
-        </p:blipFill>
-        <p:spPr>
-          <a:xfrm>
-            <a:off x="4534263" y="1138238"/>
-            <a:ext cx="4048125" cy="2867025"/>
-          </a:xfrm>
-          <a:prstGeom prst="rect">
-            <a:avLst/>
-          </a:prstGeom>
-          <a:noFill/>
-          <a:ln>
-            <a:noFill/>
-          </a:ln>
-        </p:spPr>
-      </p:pic>
     </p:spTree>
   </p:cSld>
   <p:clrMapOvr>
@@ -8935,7 +9233,7 @@
   <p:cSld>
     <p:spTree>
       <p:nvGrpSpPr>
-        <p:cNvPr id="91" name="Shape 91"/>
+        <p:cNvPr id="92" name="Shape 92"/>
         <p:cNvGrpSpPr/>
         <p:nvPr/>
       </p:nvGrpSpPr>
@@ -8949,7 +9247,7 @@
       </p:grpSpPr>
       <p:sp>
         <p:nvSpPr>
-          <p:cNvPr id="92" name="Shape 92"/>
+          <p:cNvPr id="93" name="Shape 93"/>
           <p:cNvSpPr txBox="1"/>
           <p:nvPr>
             <p:ph type="title"/>
@@ -8957,15 +9255,15 @@
         </p:nvSpPr>
         <p:spPr>
           <a:xfrm>
-            <a:off x="4273325" y="1551775"/>
-            <a:ext cx="4241400" cy="1522800"/>
+            <a:off x="490250" y="526350"/>
+            <a:ext cx="5604000" cy="4090800"/>
           </a:xfrm>
           <a:prstGeom prst="rect">
             <a:avLst/>
           </a:prstGeom>
         </p:spPr>
         <p:txBody>
-          <a:bodyPr anchorCtr="0" anchor="b" bIns="91425" lIns="91425" rIns="91425" wrap="square" tIns="91425">
+          <a:bodyPr anchorCtr="0" anchor="ctr" bIns="91425" lIns="91425" rIns="91425" wrap="square" tIns="91425">
             <a:noAutofit/>
           </a:bodyPr>
           <a:lstStyle/>
@@ -8978,14 +9276,14 @@
             </a:pPr>
             <a:r>
               <a:rPr lang="en"/>
-              <a:t>Credit Card Frauds</a:t>
+              <a:t>Sampling</a:t>
             </a:r>
           </a:p>
         </p:txBody>
       </p:sp>
       <p:pic>
         <p:nvPicPr>
-          <p:cNvPr id="93" name="Shape 93"/>
+          <p:cNvPr id="94" name="Shape 94"/>
           <p:cNvPicPr preferRelativeResize="0"/>
           <p:nvPr/>
         </p:nvPicPr>
@@ -8999,8 +9297,8 @@
         </p:blipFill>
         <p:spPr>
           <a:xfrm>
-            <a:off x="311300" y="1370575"/>
-            <a:ext cx="3479076" cy="2261400"/>
+            <a:off x="4534263" y="1138238"/>
+            <a:ext cx="4048125" cy="2867025"/>
           </a:xfrm>
           <a:prstGeom prst="rect">
             <a:avLst/>
@@ -9011,52 +9309,6 @@
           </a:ln>
         </p:spPr>
       </p:pic>
-      <p:sp>
-        <p:nvSpPr>
-          <p:cNvPr id="94" name="Shape 94"/>
-          <p:cNvSpPr txBox="1"/>
-          <p:nvPr/>
-        </p:nvSpPr>
-        <p:spPr>
-          <a:xfrm>
-            <a:off x="4273325" y="3241700"/>
-            <a:ext cx="4756800" cy="616800"/>
-          </a:xfrm>
-          <a:prstGeom prst="rect">
-            <a:avLst/>
-          </a:prstGeom>
-          <a:noFill/>
-          <a:ln>
-            <a:noFill/>
-          </a:ln>
-        </p:spPr>
-        <p:txBody>
-          <a:bodyPr anchorCtr="0" anchor="t" bIns="91425" lIns="91425" rIns="91425" wrap="square" tIns="91425">
-            <a:noAutofit/>
-          </a:bodyPr>
-          <a:lstStyle/>
-          <a:p>
-            <a:pPr lvl="0" rtl="0">
-              <a:spcBef>
-                <a:spcPts val="0"/>
-              </a:spcBef>
-              <a:buNone/>
-            </a:pPr>
-            <a:r>
-              <a:rPr lang="en">
-                <a:solidFill>
-                  <a:schemeClr val="lt1"/>
-                </a:solidFill>
-                <a:latin typeface="Old Standard TT"/>
-                <a:ea typeface="Old Standard TT"/>
-                <a:cs typeface="Old Standard TT"/>
-                <a:sym typeface="Old Standard TT"/>
-              </a:rPr>
-              <a:t>What fraction of credit card transactions are fraudulent?</a:t>
-            </a:r>
-          </a:p>
-        </p:txBody>
-      </p:sp>
     </p:spTree>
   </p:cSld>
   <p:clrMapOvr>
@@ -9092,7 +9344,7 @@
         </p:nvSpPr>
         <p:spPr>
           <a:xfrm>
-            <a:off x="356250" y="1443725"/>
+            <a:off x="4273325" y="1551775"/>
             <a:ext cx="4241400" cy="1522800"/>
           </a:xfrm>
           <a:prstGeom prst="rect">
@@ -9105,7 +9357,7 @@
           </a:bodyPr>
           <a:lstStyle/>
           <a:p>
-            <a:pPr lvl="0" rtl="0">
+            <a:pPr lvl="0">
               <a:spcBef>
                 <a:spcPts val="0"/>
               </a:spcBef>
@@ -9113,7 +9365,7 @@
             </a:pPr>
             <a:r>
               <a:rPr lang="en"/>
-              <a:t>Olympian Weights</a:t>
+              <a:t>Credit Card Frauds</a:t>
             </a:r>
           </a:p>
         </p:txBody>
@@ -9134,8 +9386,8 @@
         </p:blipFill>
         <p:spPr>
           <a:xfrm>
-            <a:off x="5327250" y="1386000"/>
-            <a:ext cx="3151950" cy="2101300"/>
+            <a:off x="311300" y="1370575"/>
+            <a:ext cx="3479076" cy="2261400"/>
           </a:xfrm>
           <a:prstGeom prst="rect">
             <a:avLst/>
@@ -9149,6 +9401,141 @@
       <p:sp>
         <p:nvSpPr>
           <p:cNvPr id="101" name="Shape 101"/>
+          <p:cNvSpPr txBox="1"/>
+          <p:nvPr/>
+        </p:nvSpPr>
+        <p:spPr>
+          <a:xfrm>
+            <a:off x="4273325" y="3241700"/>
+            <a:ext cx="4756800" cy="616800"/>
+          </a:xfrm>
+          <a:prstGeom prst="rect">
+            <a:avLst/>
+          </a:prstGeom>
+          <a:noFill/>
+          <a:ln>
+            <a:noFill/>
+          </a:ln>
+        </p:spPr>
+        <p:txBody>
+          <a:bodyPr anchorCtr="0" anchor="t" bIns="91425" lIns="91425" rIns="91425" wrap="square" tIns="91425">
+            <a:noAutofit/>
+          </a:bodyPr>
+          <a:lstStyle/>
+          <a:p>
+            <a:pPr lvl="0" rtl="0">
+              <a:spcBef>
+                <a:spcPts val="0"/>
+              </a:spcBef>
+              <a:buNone/>
+            </a:pPr>
+            <a:r>
+              <a:rPr lang="en">
+                <a:solidFill>
+                  <a:schemeClr val="lt1"/>
+                </a:solidFill>
+                <a:latin typeface="Old Standard TT"/>
+                <a:ea typeface="Old Standard TT"/>
+                <a:cs typeface="Old Standard TT"/>
+                <a:sym typeface="Old Standard TT"/>
+              </a:rPr>
+              <a:t>What fraction of credit card transactions are fraudulent?</a:t>
+            </a:r>
+          </a:p>
+        </p:txBody>
+      </p:sp>
+    </p:spTree>
+  </p:cSld>
+  <p:clrMapOvr>
+    <a:masterClrMapping/>
+  </p:clrMapOvr>
+</p:sld>
+</file>
+
+<file path=ppt/slides/slide8.xml><?xml version="1.0" encoding="utf-8"?>
+<p:sld xmlns:a="http://schemas.openxmlformats.org/drawingml/2006/main" xmlns:r="http://schemas.openxmlformats.org/officeDocument/2006/relationships" xmlns:mc="http://schemas.openxmlformats.org/markup-compatibility/2006" xmlns:mv="urn:schemas-microsoft-com:mac:vml" xmlns:p="http://schemas.openxmlformats.org/presentationml/2006/main" xmlns:c="http://schemas.openxmlformats.org/drawingml/2006/chart" xmlns:dgm="http://schemas.openxmlformats.org/drawingml/2006/diagram" xmlns:o="urn:schemas-microsoft-com:office:office" xmlns:v="urn:schemas-microsoft-com:vml" xmlns:pvml="urn:schemas-microsoft-com:office:powerpoint" xmlns:com="http://schemas.openxmlformats.org/drawingml/2006/compatibility" xmlns:p14="http://schemas.microsoft.com/office/powerpoint/2010/main" xmlns:p15="http://schemas.microsoft.com/office/powerpoint/2012/main">
+  <p:cSld>
+    <p:spTree>
+      <p:nvGrpSpPr>
+        <p:cNvPr id="105" name="Shape 105"/>
+        <p:cNvGrpSpPr/>
+        <p:nvPr/>
+      </p:nvGrpSpPr>
+      <p:grpSpPr>
+        <a:xfrm>
+          <a:off x="0" y="0"/>
+          <a:ext cx="0" cy="0"/>
+          <a:chOff x="0" y="0"/>
+          <a:chExt cx="0" cy="0"/>
+        </a:xfrm>
+      </p:grpSpPr>
+      <p:sp>
+        <p:nvSpPr>
+          <p:cNvPr id="106" name="Shape 106"/>
+          <p:cNvSpPr txBox="1"/>
+          <p:nvPr>
+            <p:ph type="title"/>
+          </p:nvPr>
+        </p:nvSpPr>
+        <p:spPr>
+          <a:xfrm>
+            <a:off x="356250" y="1443725"/>
+            <a:ext cx="4241400" cy="1522800"/>
+          </a:xfrm>
+          <a:prstGeom prst="rect">
+            <a:avLst/>
+          </a:prstGeom>
+        </p:spPr>
+        <p:txBody>
+          <a:bodyPr anchorCtr="0" anchor="b" bIns="91425" lIns="91425" rIns="91425" wrap="square" tIns="91425">
+            <a:noAutofit/>
+          </a:bodyPr>
+          <a:lstStyle/>
+          <a:p>
+            <a:pPr lvl="0" rtl="0">
+              <a:spcBef>
+                <a:spcPts val="0"/>
+              </a:spcBef>
+              <a:buNone/>
+            </a:pPr>
+            <a:r>
+              <a:rPr lang="en"/>
+              <a:t>Olympian Weights</a:t>
+            </a:r>
+          </a:p>
+        </p:txBody>
+      </p:sp>
+      <p:pic>
+        <p:nvPicPr>
+          <p:cNvPr id="107" name="Shape 107"/>
+          <p:cNvPicPr preferRelativeResize="0"/>
+          <p:nvPr/>
+        </p:nvPicPr>
+        <p:blipFill>
+          <a:blip r:embed="rId3">
+            <a:alphaModFix/>
+          </a:blip>
+          <a:stretch>
+            <a:fillRect/>
+          </a:stretch>
+        </p:blipFill>
+        <p:spPr>
+          <a:xfrm>
+            <a:off x="5327250" y="1386000"/>
+            <a:ext cx="3151950" cy="2101300"/>
+          </a:xfrm>
+          <a:prstGeom prst="rect">
+            <a:avLst/>
+          </a:prstGeom>
+          <a:noFill/>
+          <a:ln>
+            <a:noFill/>
+          </a:ln>
+        </p:spPr>
+      </p:pic>
+      <p:sp>
+        <p:nvSpPr>
+          <p:cNvPr id="108" name="Shape 108"/>
           <p:cNvSpPr txBox="1"/>
           <p:nvPr/>
         </p:nvSpPr>
@@ -9212,12 +9599,12 @@
 </p:sld>
 </file>
 
-<file path=ppt/slides/slide8.xml><?xml version="1.0" encoding="utf-8"?>
+<file path=ppt/slides/slide9.xml><?xml version="1.0" encoding="utf-8"?>
 <p:sld xmlns:a="http://schemas.openxmlformats.org/drawingml/2006/main" xmlns:r="http://schemas.openxmlformats.org/officeDocument/2006/relationships" xmlns:mc="http://schemas.openxmlformats.org/markup-compatibility/2006" xmlns:mv="urn:schemas-microsoft-com:mac:vml" xmlns:p="http://schemas.openxmlformats.org/presentationml/2006/main" xmlns:c="http://schemas.openxmlformats.org/drawingml/2006/chart" xmlns:dgm="http://schemas.openxmlformats.org/drawingml/2006/diagram" xmlns:o="urn:schemas-microsoft-com:office:office" xmlns:v="urn:schemas-microsoft-com:vml" xmlns:pvml="urn:schemas-microsoft-com:office:powerpoint" xmlns:com="http://schemas.openxmlformats.org/drawingml/2006/compatibility" xmlns:p14="http://schemas.microsoft.com/office/powerpoint/2010/main" xmlns:p15="http://schemas.microsoft.com/office/powerpoint/2012/main">
   <p:cSld>
     <p:spTree>
       <p:nvGrpSpPr>
-        <p:cNvPr id="105" name="Shape 105"/>
+        <p:cNvPr id="112" name="Shape 112"/>
         <p:cNvGrpSpPr/>
         <p:nvPr/>
       </p:nvGrpSpPr>
@@ -9231,7 +9618,7 @@
       </p:grpSpPr>
       <p:sp>
         <p:nvSpPr>
-          <p:cNvPr id="106" name="Shape 106"/>
+          <p:cNvPr id="113" name="Shape 113"/>
           <p:cNvSpPr txBox="1"/>
           <p:nvPr>
             <p:ph type="title"/>
@@ -9261,180 +9648,6 @@
             <a:r>
               <a:rPr lang="en"/>
               <a:t>Hypothesis Testing</a:t>
-            </a:r>
-          </a:p>
-        </p:txBody>
-      </p:sp>
-      <p:pic>
-        <p:nvPicPr>
-          <p:cNvPr id="107" name="Shape 107"/>
-          <p:cNvPicPr preferRelativeResize="0"/>
-          <p:nvPr/>
-        </p:nvPicPr>
-        <p:blipFill>
-          <a:blip r:embed="rId3">
-            <a:alphaModFix/>
-          </a:blip>
-          <a:stretch>
-            <a:fillRect/>
-          </a:stretch>
-        </p:blipFill>
-        <p:spPr>
-          <a:xfrm>
-            <a:off x="5662000" y="914400"/>
-            <a:ext cx="2200275" cy="3314700"/>
-          </a:xfrm>
-          <a:prstGeom prst="rect">
-            <a:avLst/>
-          </a:prstGeom>
-          <a:noFill/>
-          <a:ln>
-            <a:noFill/>
-          </a:ln>
-        </p:spPr>
-      </p:pic>
-    </p:spTree>
-  </p:cSld>
-  <p:clrMapOvr>
-    <a:masterClrMapping/>
-  </p:clrMapOvr>
-</p:sld>
-</file>
-
-<file path=ppt/slides/slide9.xml><?xml version="1.0" encoding="utf-8"?>
-<p:sld xmlns:a="http://schemas.openxmlformats.org/drawingml/2006/main" xmlns:r="http://schemas.openxmlformats.org/officeDocument/2006/relationships" xmlns:mc="http://schemas.openxmlformats.org/markup-compatibility/2006" xmlns:mv="urn:schemas-microsoft-com:mac:vml" xmlns:p="http://schemas.openxmlformats.org/presentationml/2006/main" xmlns:c="http://schemas.openxmlformats.org/drawingml/2006/chart" xmlns:dgm="http://schemas.openxmlformats.org/drawingml/2006/diagram" xmlns:o="urn:schemas-microsoft-com:office:office" xmlns:v="urn:schemas-microsoft-com:vml" xmlns:pvml="urn:schemas-microsoft-com:office:powerpoint" xmlns:com="http://schemas.openxmlformats.org/drawingml/2006/compatibility" xmlns:p14="http://schemas.microsoft.com/office/powerpoint/2010/main" xmlns:p15="http://schemas.microsoft.com/office/powerpoint/2012/main">
-  <p:cSld>
-    <p:spTree>
-      <p:nvGrpSpPr>
-        <p:cNvPr id="111" name="Shape 111"/>
-        <p:cNvGrpSpPr/>
-        <p:nvPr/>
-      </p:nvGrpSpPr>
-      <p:grpSpPr>
-        <a:xfrm>
-          <a:off x="0" y="0"/>
-          <a:ext cx="0" cy="0"/>
-          <a:chOff x="0" y="0"/>
-          <a:chExt cx="0" cy="0"/>
-        </a:xfrm>
-      </p:grpSpPr>
-      <p:sp>
-        <p:nvSpPr>
-          <p:cNvPr id="112" name="Shape 112"/>
-          <p:cNvSpPr txBox="1"/>
-          <p:nvPr>
-            <p:ph type="title"/>
-          </p:nvPr>
-        </p:nvSpPr>
-        <p:spPr>
-          <a:xfrm>
-            <a:off x="311700" y="445025"/>
-            <a:ext cx="8520600" cy="613200"/>
-          </a:xfrm>
-          <a:prstGeom prst="rect">
-            <a:avLst/>
-          </a:prstGeom>
-        </p:spPr>
-        <p:txBody>
-          <a:bodyPr anchorCtr="0" anchor="t" bIns="91425" lIns="91425" rIns="91425" wrap="square" tIns="91425">
-            <a:noAutofit/>
-          </a:bodyPr>
-          <a:lstStyle/>
-          <a:p>
-            <a:pPr lvl="0">
-              <a:spcBef>
-                <a:spcPts val="0"/>
-              </a:spcBef>
-              <a:buNone/>
-            </a:pPr>
-            <a:r>
-              <a:rPr lang="en"/>
-              <a:t>Terminology</a:t>
-            </a:r>
-          </a:p>
-        </p:txBody>
-      </p:sp>
-      <p:sp>
-        <p:nvSpPr>
-          <p:cNvPr id="113" name="Shape 113"/>
-          <p:cNvSpPr txBox="1"/>
-          <p:nvPr>
-            <p:ph idx="1" type="body"/>
-          </p:nvPr>
-        </p:nvSpPr>
-        <p:spPr>
-          <a:xfrm>
-            <a:off x="311700" y="1464300"/>
-            <a:ext cx="8520600" cy="3397200"/>
-          </a:xfrm>
-          <a:prstGeom prst="rect">
-            <a:avLst/>
-          </a:prstGeom>
-        </p:spPr>
-        <p:txBody>
-          <a:bodyPr anchorCtr="0" anchor="t" bIns="91425" lIns="91425" rIns="91425" wrap="square" tIns="91425">
-            <a:noAutofit/>
-          </a:bodyPr>
-          <a:lstStyle/>
-          <a:p>
-            <a:pPr indent="-342900" lvl="0" marL="457200" rtl="0">
-              <a:spcBef>
-                <a:spcPts val="0"/>
-              </a:spcBef>
-              <a:spcAft>
-                <a:spcPts val="0"/>
-              </a:spcAft>
-              <a:buSzPts val="1800"/>
-              <a:buAutoNum type="arabicPeriod"/>
-            </a:pPr>
-            <a:r>
-              <a:rPr lang="en"/>
-              <a:t>Null and Alternate Hypotheses</a:t>
-            </a:r>
-          </a:p>
-          <a:p>
-            <a:pPr indent="-342900" lvl="0" marL="457200" rtl="0">
-              <a:spcBef>
-                <a:spcPts val="0"/>
-              </a:spcBef>
-              <a:spcAft>
-                <a:spcPts val="0"/>
-              </a:spcAft>
-              <a:buSzPts val="1800"/>
-              <a:buAutoNum type="arabicPeriod"/>
-            </a:pPr>
-            <a:r>
-              <a:rPr lang="en"/>
-              <a:t>Significance Level</a:t>
-            </a:r>
-          </a:p>
-          <a:p>
-            <a:pPr indent="-342900" lvl="0" marL="457200" rtl="0">
-              <a:spcBef>
-                <a:spcPts val="0"/>
-              </a:spcBef>
-              <a:spcAft>
-                <a:spcPts val="0"/>
-              </a:spcAft>
-              <a:buSzPts val="1800"/>
-              <a:buAutoNum type="arabicPeriod"/>
-            </a:pPr>
-            <a:r>
-              <a:rPr lang="en"/>
-              <a:t>Statistical Test</a:t>
-            </a:r>
-          </a:p>
-          <a:p>
-            <a:pPr indent="-342900" lvl="0" marL="457200">
-              <a:spcBef>
-                <a:spcPts val="0"/>
-              </a:spcBef>
-              <a:buSzPts val="1800"/>
-              <a:buAutoNum type="arabicPeriod"/>
-            </a:pPr>
-            <a:r>
-              <a:rPr lang="en"/>
-              <a:t>P-Values</a:t>
             </a:r>
           </a:p>
         </p:txBody>
@@ -9455,8 +9668,8 @@
         </p:blipFill>
         <p:spPr>
           <a:xfrm>
-            <a:off x="4681546" y="1082363"/>
-            <a:ext cx="3953776" cy="2978775"/>
+            <a:off x="5662000" y="914400"/>
+            <a:ext cx="2200275" cy="3314700"/>
           </a:xfrm>
           <a:prstGeom prst="rect">
             <a:avLst/>

</xml_diff>